<commit_message>
updated files in Day 1 folder
</commit_message>
<xml_diff>
--- a/Day_1/Lectures/Day_1_Lecture_2_AI_ML_Applications_in_Biology_and_Chemistry.pptx
+++ b/Day_1/Lectures/Day_1_Lecture_2_AI_ML_Applications_in_Biology_and_Chemistry.pptx
@@ -922,7 +922,7 @@
   <p:cSld>
     <p:spTree>
       <p:nvGrpSpPr>
-        <p:cNvPr id="255" name="Shape 255"/>
+        <p:cNvPr id="256" name="Shape 256"/>
         <p:cNvGrpSpPr/>
         <p:nvPr/>
       </p:nvGrpSpPr>
@@ -936,7 +936,7 @@
       </p:grpSpPr>
       <p:sp>
         <p:nvSpPr>
-          <p:cNvPr id="256" name="Google Shape;256;g116cbeaf380_0_48:notes"/>
+          <p:cNvPr id="257" name="Google Shape;257;g116cbeaf380_0_48:notes"/>
           <p:cNvSpPr/>
           <p:nvPr>
             <p:ph idx="2" type="sldImg"/>
@@ -971,7 +971,7 @@
       </p:sp>
       <p:sp>
         <p:nvSpPr>
-          <p:cNvPr id="257" name="Google Shape;257;g116cbeaf380_0_48:notes"/>
+          <p:cNvPr id="258" name="Google Shape;258;g116cbeaf380_0_48:notes"/>
           <p:cNvSpPr txBox="1"/>
           <p:nvPr>
             <p:ph idx="1" type="body"/>
@@ -1109,7 +1109,7 @@
   <p:cSld>
     <p:spTree>
       <p:nvGrpSpPr>
-        <p:cNvPr id="265" name="Shape 265"/>
+        <p:cNvPr id="266" name="Shape 266"/>
         <p:cNvGrpSpPr/>
         <p:nvPr/>
       </p:nvGrpSpPr>
@@ -1123,7 +1123,7 @@
       </p:grpSpPr>
       <p:sp>
         <p:nvSpPr>
-          <p:cNvPr id="266" name="Google Shape;266;g116cbeaf380_0_57:notes"/>
+          <p:cNvPr id="267" name="Google Shape;267;g116cbeaf380_0_57:notes"/>
           <p:cNvSpPr/>
           <p:nvPr>
             <p:ph idx="2" type="sldImg"/>
@@ -1158,7 +1158,7 @@
       </p:sp>
       <p:sp>
         <p:nvSpPr>
-          <p:cNvPr id="267" name="Google Shape;267;g116cbeaf380_0_57:notes"/>
+          <p:cNvPr id="268" name="Google Shape;268;g116cbeaf380_0_57:notes"/>
           <p:cNvSpPr txBox="1"/>
           <p:nvPr>
             <p:ph idx="1" type="body"/>
@@ -1296,7 +1296,7 @@
   <p:cSld>
     <p:spTree>
       <p:nvGrpSpPr>
-        <p:cNvPr id="275" name="Shape 275"/>
+        <p:cNvPr id="276" name="Shape 276"/>
         <p:cNvGrpSpPr/>
         <p:nvPr/>
       </p:nvGrpSpPr>
@@ -1310,7 +1310,7 @@
       </p:grpSpPr>
       <p:sp>
         <p:nvSpPr>
-          <p:cNvPr id="276" name="Google Shape;276;g116cbeaf380_0_66:notes"/>
+          <p:cNvPr id="277" name="Google Shape;277;g116cbeaf380_0_66:notes"/>
           <p:cNvSpPr/>
           <p:nvPr>
             <p:ph idx="2" type="sldImg"/>
@@ -1345,7 +1345,7 @@
       </p:sp>
       <p:sp>
         <p:nvSpPr>
-          <p:cNvPr id="277" name="Google Shape;277;g116cbeaf380_0_66:notes"/>
+          <p:cNvPr id="278" name="Google Shape;278;g116cbeaf380_0_66:notes"/>
           <p:cNvSpPr txBox="1"/>
           <p:nvPr>
             <p:ph idx="1" type="body"/>
@@ -1483,7 +1483,7 @@
   <p:cSld>
     <p:spTree>
       <p:nvGrpSpPr>
-        <p:cNvPr id="285" name="Shape 285"/>
+        <p:cNvPr id="286" name="Shape 286"/>
         <p:cNvGrpSpPr/>
         <p:nvPr/>
       </p:nvGrpSpPr>
@@ -1497,7 +1497,7 @@
       </p:grpSpPr>
       <p:sp>
         <p:nvSpPr>
-          <p:cNvPr id="286" name="Google Shape;286;g116cbeaf380_0_75:notes"/>
+          <p:cNvPr id="287" name="Google Shape;287;g116cbeaf380_0_75:notes"/>
           <p:cNvSpPr/>
           <p:nvPr>
             <p:ph idx="2" type="sldImg"/>
@@ -1532,7 +1532,7 @@
       </p:sp>
       <p:sp>
         <p:nvSpPr>
-          <p:cNvPr id="287" name="Google Shape;287;g116cbeaf380_0_75:notes"/>
+          <p:cNvPr id="288" name="Google Shape;288;g116cbeaf380_0_75:notes"/>
           <p:cNvSpPr txBox="1"/>
           <p:nvPr>
             <p:ph idx="1" type="body"/>
@@ -1670,7 +1670,7 @@
   <p:cSld>
     <p:spTree>
       <p:nvGrpSpPr>
-        <p:cNvPr id="295" name="Shape 295"/>
+        <p:cNvPr id="296" name="Shape 296"/>
         <p:cNvGrpSpPr/>
         <p:nvPr/>
       </p:nvGrpSpPr>
@@ -1684,7 +1684,7 @@
       </p:grpSpPr>
       <p:sp>
         <p:nvSpPr>
-          <p:cNvPr id="296" name="Google Shape;296;g116cbeaf380_0_84:notes"/>
+          <p:cNvPr id="297" name="Google Shape;297;g116cbeaf380_0_84:notes"/>
           <p:cNvSpPr/>
           <p:nvPr>
             <p:ph idx="2" type="sldImg"/>
@@ -1719,7 +1719,7 @@
       </p:sp>
       <p:sp>
         <p:nvSpPr>
-          <p:cNvPr id="297" name="Google Shape;297;g116cbeaf380_0_84:notes"/>
+          <p:cNvPr id="298" name="Google Shape;298;g116cbeaf380_0_84:notes"/>
           <p:cNvSpPr txBox="1"/>
           <p:nvPr>
             <p:ph idx="1" type="body"/>
@@ -1857,7 +1857,7 @@
   <p:cSld>
     <p:spTree>
       <p:nvGrpSpPr>
-        <p:cNvPr id="305" name="Shape 305"/>
+        <p:cNvPr id="306" name="Shape 306"/>
         <p:cNvGrpSpPr/>
         <p:nvPr/>
       </p:nvGrpSpPr>
@@ -1871,7 +1871,7 @@
       </p:grpSpPr>
       <p:sp>
         <p:nvSpPr>
-          <p:cNvPr id="306" name="Google Shape;306;g11c1af62bf0_0_1:notes"/>
+          <p:cNvPr id="307" name="Google Shape;307;g11c1af62bf0_0_1:notes"/>
           <p:cNvSpPr/>
           <p:nvPr>
             <p:ph idx="2" type="sldImg"/>
@@ -1906,7 +1906,7 @@
       </p:sp>
       <p:sp>
         <p:nvSpPr>
-          <p:cNvPr id="307" name="Google Shape;307;g11c1af62bf0_0_1:notes"/>
+          <p:cNvPr id="308" name="Google Shape;308;g11c1af62bf0_0_1:notes"/>
           <p:cNvSpPr txBox="1"/>
           <p:nvPr>
             <p:ph idx="1" type="body"/>
@@ -1956,7 +1956,7 @@
   <p:cSld>
     <p:spTree>
       <p:nvGrpSpPr>
-        <p:cNvPr id="314" name="Shape 314"/>
+        <p:cNvPr id="315" name="Shape 315"/>
         <p:cNvGrpSpPr/>
         <p:nvPr/>
       </p:nvGrpSpPr>
@@ -1970,7 +1970,7 @@
       </p:grpSpPr>
       <p:sp>
         <p:nvSpPr>
-          <p:cNvPr id="315" name="Google Shape;315;g116cbeaf380_0_93:notes"/>
+          <p:cNvPr id="316" name="Google Shape;316;g116cbeaf380_0_93:notes"/>
           <p:cNvSpPr/>
           <p:nvPr>
             <p:ph idx="2" type="sldImg"/>
@@ -2005,7 +2005,7 @@
       </p:sp>
       <p:sp>
         <p:nvSpPr>
-          <p:cNvPr id="316" name="Google Shape;316;g116cbeaf380_0_93:notes"/>
+          <p:cNvPr id="317" name="Google Shape;317;g116cbeaf380_0_93:notes"/>
           <p:cNvSpPr txBox="1"/>
           <p:nvPr>
             <p:ph idx="1" type="body"/>
@@ -2143,7 +2143,7 @@
   <p:cSld>
     <p:spTree>
       <p:nvGrpSpPr>
-        <p:cNvPr id="324" name="Shape 324"/>
+        <p:cNvPr id="325" name="Shape 325"/>
         <p:cNvGrpSpPr/>
         <p:nvPr/>
       </p:nvGrpSpPr>
@@ -2157,7 +2157,7 @@
       </p:grpSpPr>
       <p:sp>
         <p:nvSpPr>
-          <p:cNvPr id="325" name="Google Shape;325;g116cbeaf380_0_103:notes"/>
+          <p:cNvPr id="326" name="Google Shape;326;g116cbeaf380_0_103:notes"/>
           <p:cNvSpPr/>
           <p:nvPr>
             <p:ph idx="2" type="sldImg"/>
@@ -2192,7 +2192,7 @@
       </p:sp>
       <p:sp>
         <p:nvSpPr>
-          <p:cNvPr id="326" name="Google Shape;326;g116cbeaf380_0_103:notes"/>
+          <p:cNvPr id="327" name="Google Shape;327;g116cbeaf380_0_103:notes"/>
           <p:cNvSpPr txBox="1"/>
           <p:nvPr>
             <p:ph idx="1" type="body"/>
@@ -2330,7 +2330,7 @@
   <p:cSld>
     <p:spTree>
       <p:nvGrpSpPr>
-        <p:cNvPr id="334" name="Shape 334"/>
+        <p:cNvPr id="335" name="Shape 335"/>
         <p:cNvGrpSpPr/>
         <p:nvPr/>
       </p:nvGrpSpPr>
@@ -2344,7 +2344,7 @@
       </p:grpSpPr>
       <p:sp>
         <p:nvSpPr>
-          <p:cNvPr id="335" name="Google Shape;335;g116cbeaf380_0_112:notes"/>
+          <p:cNvPr id="336" name="Google Shape;336;g116cbeaf380_0_112:notes"/>
           <p:cNvSpPr/>
           <p:nvPr>
             <p:ph idx="2" type="sldImg"/>
@@ -2379,7 +2379,7 @@
       </p:sp>
       <p:sp>
         <p:nvSpPr>
-          <p:cNvPr id="336" name="Google Shape;336;g116cbeaf380_0_112:notes"/>
+          <p:cNvPr id="337" name="Google Shape;337;g116cbeaf380_0_112:notes"/>
           <p:cNvSpPr txBox="1"/>
           <p:nvPr>
             <p:ph idx="1" type="body"/>
@@ -2517,7 +2517,7 @@
   <p:cSld>
     <p:spTree>
       <p:nvGrpSpPr>
-        <p:cNvPr id="344" name="Shape 344"/>
+        <p:cNvPr id="345" name="Shape 345"/>
         <p:cNvGrpSpPr/>
         <p:nvPr/>
       </p:nvGrpSpPr>
@@ -2531,7 +2531,7 @@
       </p:grpSpPr>
       <p:sp>
         <p:nvSpPr>
-          <p:cNvPr id="345" name="Google Shape;345;g116cbeaf380_0_123:notes"/>
+          <p:cNvPr id="346" name="Google Shape;346;g116cbeaf380_0_123:notes"/>
           <p:cNvSpPr/>
           <p:nvPr>
             <p:ph idx="2" type="sldImg"/>
@@ -2566,7 +2566,7 @@
       </p:sp>
       <p:sp>
         <p:nvSpPr>
-          <p:cNvPr id="346" name="Google Shape;346;g116cbeaf380_0_123:notes"/>
+          <p:cNvPr id="347" name="Google Shape;347;g116cbeaf380_0_123:notes"/>
           <p:cNvSpPr txBox="1"/>
           <p:nvPr>
             <p:ph idx="1" type="body"/>
@@ -2704,7 +2704,7 @@
   <p:cSld>
     <p:spTree>
       <p:nvGrpSpPr>
-        <p:cNvPr id="179" name="Shape 179"/>
+        <p:cNvPr id="180" name="Shape 180"/>
         <p:cNvGrpSpPr/>
         <p:nvPr/>
       </p:nvGrpSpPr>
@@ -2718,7 +2718,7 @@
       </p:grpSpPr>
       <p:sp>
         <p:nvSpPr>
-          <p:cNvPr id="180" name="Google Shape;180;gc6f9e470d_0_0:notes"/>
+          <p:cNvPr id="181" name="Google Shape;181;gc6f9e470d_0_0:notes"/>
           <p:cNvSpPr/>
           <p:nvPr>
             <p:ph idx="2" type="sldImg"/>
@@ -2753,7 +2753,7 @@
       </p:sp>
       <p:sp>
         <p:nvSpPr>
-          <p:cNvPr id="181" name="Google Shape;181;gc6f9e470d_0_0:notes"/>
+          <p:cNvPr id="182" name="Google Shape;182;gc6f9e470d_0_0:notes"/>
           <p:cNvSpPr txBox="1"/>
           <p:nvPr>
             <p:ph idx="1" type="body"/>
@@ -2803,7 +2803,7 @@
   <p:cSld>
     <p:spTree>
       <p:nvGrpSpPr>
-        <p:cNvPr id="354" name="Shape 354"/>
+        <p:cNvPr id="355" name="Shape 355"/>
         <p:cNvGrpSpPr/>
         <p:nvPr/>
       </p:nvGrpSpPr>
@@ -2817,7 +2817,7 @@
       </p:grpSpPr>
       <p:sp>
         <p:nvSpPr>
-          <p:cNvPr id="355" name="Google Shape;355;g116cbeaf380_0_135:notes"/>
+          <p:cNvPr id="356" name="Google Shape;356;g116cbeaf380_0_135:notes"/>
           <p:cNvSpPr/>
           <p:nvPr>
             <p:ph idx="2" type="sldImg"/>
@@ -2852,7 +2852,7 @@
       </p:sp>
       <p:sp>
         <p:nvSpPr>
-          <p:cNvPr id="356" name="Google Shape;356;g116cbeaf380_0_135:notes"/>
+          <p:cNvPr id="357" name="Google Shape;357;g116cbeaf380_0_135:notes"/>
           <p:cNvSpPr txBox="1"/>
           <p:nvPr>
             <p:ph idx="1" type="body"/>
@@ -2990,7 +2990,7 @@
   <p:cSld>
     <p:spTree>
       <p:nvGrpSpPr>
-        <p:cNvPr id="364" name="Shape 364"/>
+        <p:cNvPr id="365" name="Shape 365"/>
         <p:cNvGrpSpPr/>
         <p:nvPr/>
       </p:nvGrpSpPr>
@@ -3004,7 +3004,7 @@
       </p:grpSpPr>
       <p:sp>
         <p:nvSpPr>
-          <p:cNvPr id="365" name="Google Shape;365;g116cbeaf380_0_144:notes"/>
+          <p:cNvPr id="366" name="Google Shape;366;g116cbeaf380_0_144:notes"/>
           <p:cNvSpPr/>
           <p:nvPr>
             <p:ph idx="2" type="sldImg"/>
@@ -3039,7 +3039,7 @@
       </p:sp>
       <p:sp>
         <p:nvSpPr>
-          <p:cNvPr id="366" name="Google Shape;366;g116cbeaf380_0_144:notes"/>
+          <p:cNvPr id="367" name="Google Shape;367;g116cbeaf380_0_144:notes"/>
           <p:cNvSpPr txBox="1"/>
           <p:nvPr>
             <p:ph idx="1" type="body"/>
@@ -3177,7 +3177,7 @@
   <p:cSld>
     <p:spTree>
       <p:nvGrpSpPr>
-        <p:cNvPr id="374" name="Shape 374"/>
+        <p:cNvPr id="375" name="Shape 375"/>
         <p:cNvGrpSpPr/>
         <p:nvPr/>
       </p:nvGrpSpPr>
@@ -3191,7 +3191,7 @@
       </p:grpSpPr>
       <p:sp>
         <p:nvSpPr>
-          <p:cNvPr id="375" name="Google Shape;375;g116cbeaf380_0_154:notes"/>
+          <p:cNvPr id="376" name="Google Shape;376;g116cbeaf380_0_154:notes"/>
           <p:cNvSpPr/>
           <p:nvPr>
             <p:ph idx="2" type="sldImg"/>
@@ -3226,7 +3226,7 @@
       </p:sp>
       <p:sp>
         <p:nvSpPr>
-          <p:cNvPr id="376" name="Google Shape;376;g116cbeaf380_0_154:notes"/>
+          <p:cNvPr id="377" name="Google Shape;377;g116cbeaf380_0_154:notes"/>
           <p:cNvSpPr txBox="1"/>
           <p:nvPr>
             <p:ph idx="1" type="body"/>
@@ -3364,7 +3364,7 @@
   <p:cSld>
     <p:spTree>
       <p:nvGrpSpPr>
-        <p:cNvPr id="384" name="Shape 384"/>
+        <p:cNvPr id="385" name="Shape 385"/>
         <p:cNvGrpSpPr/>
         <p:nvPr/>
       </p:nvGrpSpPr>
@@ -3378,7 +3378,7 @@
       </p:grpSpPr>
       <p:sp>
         <p:nvSpPr>
-          <p:cNvPr id="385" name="Google Shape;385;g116cbeaf380_0_163:notes"/>
+          <p:cNvPr id="386" name="Google Shape;386;g116cbeaf380_0_163:notes"/>
           <p:cNvSpPr/>
           <p:nvPr>
             <p:ph idx="2" type="sldImg"/>
@@ -3413,7 +3413,7 @@
       </p:sp>
       <p:sp>
         <p:nvSpPr>
-          <p:cNvPr id="386" name="Google Shape;386;g116cbeaf380_0_163:notes"/>
+          <p:cNvPr id="387" name="Google Shape;387;g116cbeaf380_0_163:notes"/>
           <p:cNvSpPr txBox="1"/>
           <p:nvPr>
             <p:ph idx="1" type="body"/>
@@ -3551,7 +3551,7 @@
   <p:cSld>
     <p:spTree>
       <p:nvGrpSpPr>
-        <p:cNvPr id="394" name="Shape 394"/>
+        <p:cNvPr id="395" name="Shape 395"/>
         <p:cNvGrpSpPr/>
         <p:nvPr/>
       </p:nvGrpSpPr>
@@ -3565,7 +3565,7 @@
       </p:grpSpPr>
       <p:sp>
         <p:nvSpPr>
-          <p:cNvPr id="395" name="Google Shape;395;g10c858bddf3_0_0:notes"/>
+          <p:cNvPr id="396" name="Google Shape;396;g10c858bddf3_0_0:notes"/>
           <p:cNvSpPr/>
           <p:nvPr>
             <p:ph idx="2" type="sldImg"/>
@@ -3600,7 +3600,7 @@
       </p:sp>
       <p:sp>
         <p:nvSpPr>
-          <p:cNvPr id="396" name="Google Shape;396;g10c858bddf3_0_0:notes"/>
+          <p:cNvPr id="397" name="Google Shape;397;g10c858bddf3_0_0:notes"/>
           <p:cNvSpPr txBox="1"/>
           <p:nvPr>
             <p:ph idx="1" type="body"/>
@@ -3650,7 +3650,7 @@
   <p:cSld>
     <p:spTree>
       <p:nvGrpSpPr>
-        <p:cNvPr id="403" name="Shape 403"/>
+        <p:cNvPr id="404" name="Shape 404"/>
         <p:cNvGrpSpPr/>
         <p:nvPr/>
       </p:nvGrpSpPr>
@@ -3664,7 +3664,7 @@
       </p:grpSpPr>
       <p:sp>
         <p:nvSpPr>
-          <p:cNvPr id="404" name="Google Shape;404;g11c1af62bf0_0_9:notes"/>
+          <p:cNvPr id="405" name="Google Shape;405;g11c1af62bf0_0_9:notes"/>
           <p:cNvSpPr/>
           <p:nvPr>
             <p:ph idx="2" type="sldImg"/>
@@ -3699,7 +3699,7 @@
       </p:sp>
       <p:sp>
         <p:nvSpPr>
-          <p:cNvPr id="405" name="Google Shape;405;g11c1af62bf0_0_9:notes"/>
+          <p:cNvPr id="406" name="Google Shape;406;g11c1af62bf0_0_9:notes"/>
           <p:cNvSpPr txBox="1"/>
           <p:nvPr>
             <p:ph idx="1" type="body"/>
@@ -3749,7 +3749,7 @@
   <p:cSld>
     <p:spTree>
       <p:nvGrpSpPr>
-        <p:cNvPr id="412" name="Shape 412"/>
+        <p:cNvPr id="413" name="Shape 413"/>
         <p:cNvGrpSpPr/>
         <p:nvPr/>
       </p:nvGrpSpPr>
@@ -3763,7 +3763,7 @@
       </p:grpSpPr>
       <p:sp>
         <p:nvSpPr>
-          <p:cNvPr id="413" name="Google Shape;413;g116cbeaf380_0_199:notes"/>
+          <p:cNvPr id="414" name="Google Shape;414;g116cbeaf380_0_199:notes"/>
           <p:cNvSpPr/>
           <p:nvPr>
             <p:ph idx="2" type="sldImg"/>
@@ -3798,7 +3798,7 @@
       </p:sp>
       <p:sp>
         <p:nvSpPr>
-          <p:cNvPr id="414" name="Google Shape;414;g116cbeaf380_0_199:notes"/>
+          <p:cNvPr id="415" name="Google Shape;415;g116cbeaf380_0_199:notes"/>
           <p:cNvSpPr txBox="1"/>
           <p:nvPr>
             <p:ph idx="1" type="body"/>
@@ -3936,7 +3936,7 @@
   <p:cSld>
     <p:spTree>
       <p:nvGrpSpPr>
-        <p:cNvPr id="422" name="Shape 422"/>
+        <p:cNvPr id="423" name="Shape 423"/>
         <p:cNvGrpSpPr/>
         <p:nvPr/>
       </p:nvGrpSpPr>
@@ -3950,7 +3950,7 @@
       </p:grpSpPr>
       <p:sp>
         <p:nvSpPr>
-          <p:cNvPr id="423" name="Google Shape;423;g116cbeaf380_0_212:notes"/>
+          <p:cNvPr id="424" name="Google Shape;424;g116cbeaf380_0_212:notes"/>
           <p:cNvSpPr/>
           <p:nvPr>
             <p:ph idx="2" type="sldImg"/>
@@ -3985,7 +3985,7 @@
       </p:sp>
       <p:sp>
         <p:nvSpPr>
-          <p:cNvPr id="424" name="Google Shape;424;g116cbeaf380_0_212:notes"/>
+          <p:cNvPr id="425" name="Google Shape;425;g116cbeaf380_0_212:notes"/>
           <p:cNvSpPr txBox="1"/>
           <p:nvPr>
             <p:ph idx="1" type="body"/>
@@ -4123,7 +4123,7 @@
   <p:cSld>
     <p:spTree>
       <p:nvGrpSpPr>
-        <p:cNvPr id="432" name="Shape 432"/>
+        <p:cNvPr id="433" name="Shape 433"/>
         <p:cNvGrpSpPr/>
         <p:nvPr/>
       </p:nvGrpSpPr>
@@ -4137,7 +4137,7 @@
       </p:grpSpPr>
       <p:sp>
         <p:nvSpPr>
-          <p:cNvPr id="433" name="Google Shape;433;g116cbeaf380_0_221:notes"/>
+          <p:cNvPr id="434" name="Google Shape;434;g116cbeaf380_0_221:notes"/>
           <p:cNvSpPr/>
           <p:nvPr>
             <p:ph idx="2" type="sldImg"/>
@@ -4172,7 +4172,7 @@
       </p:sp>
       <p:sp>
         <p:nvSpPr>
-          <p:cNvPr id="434" name="Google Shape;434;g116cbeaf380_0_221:notes"/>
+          <p:cNvPr id="435" name="Google Shape;435;g116cbeaf380_0_221:notes"/>
           <p:cNvSpPr txBox="1"/>
           <p:nvPr>
             <p:ph idx="1" type="body"/>
@@ -4310,7 +4310,7 @@
   <p:cSld>
     <p:spTree>
       <p:nvGrpSpPr>
-        <p:cNvPr id="442" name="Shape 442"/>
+        <p:cNvPr id="443" name="Shape 443"/>
         <p:cNvGrpSpPr/>
         <p:nvPr/>
       </p:nvGrpSpPr>
@@ -4324,7 +4324,7 @@
       </p:grpSpPr>
       <p:sp>
         <p:nvSpPr>
-          <p:cNvPr id="443" name="Google Shape;443;g11c1af62bf0_0_17:notes"/>
+          <p:cNvPr id="444" name="Google Shape;444;g11c1af62bf0_0_17:notes"/>
           <p:cNvSpPr/>
           <p:nvPr>
             <p:ph idx="2" type="sldImg"/>
@@ -4359,7 +4359,7 @@
       </p:sp>
       <p:sp>
         <p:nvSpPr>
-          <p:cNvPr id="444" name="Google Shape;444;g11c1af62bf0_0_17:notes"/>
+          <p:cNvPr id="445" name="Google Shape;445;g11c1af62bf0_0_17:notes"/>
           <p:cNvSpPr txBox="1"/>
           <p:nvPr>
             <p:ph idx="1" type="body"/>
@@ -4409,7 +4409,7 @@
   <p:cSld>
     <p:spTree>
       <p:nvGrpSpPr>
-        <p:cNvPr id="186" name="Shape 186"/>
+        <p:cNvPr id="187" name="Shape 187"/>
         <p:cNvGrpSpPr/>
         <p:nvPr/>
       </p:nvGrpSpPr>
@@ -4423,7 +4423,7 @@
       </p:grpSpPr>
       <p:sp>
         <p:nvSpPr>
-          <p:cNvPr id="187" name="Google Shape;187;g1267878ad62_0_120:notes"/>
+          <p:cNvPr id="188" name="Google Shape;188;g1267878ad62_0_120:notes"/>
           <p:cNvSpPr/>
           <p:nvPr>
             <p:ph idx="2" type="sldImg"/>
@@ -4458,7 +4458,7 @@
       </p:sp>
       <p:sp>
         <p:nvSpPr>
-          <p:cNvPr id="188" name="Google Shape;188;g1267878ad62_0_120:notes"/>
+          <p:cNvPr id="189" name="Google Shape;189;g1267878ad62_0_120:notes"/>
           <p:cNvSpPr txBox="1"/>
           <p:nvPr>
             <p:ph idx="1" type="body"/>
@@ -4508,7 +4508,7 @@
   <p:cSld>
     <p:spTree>
       <p:nvGrpSpPr>
-        <p:cNvPr id="451" name="Shape 451"/>
+        <p:cNvPr id="452" name="Shape 452"/>
         <p:cNvGrpSpPr/>
         <p:nvPr/>
       </p:nvGrpSpPr>
@@ -4522,7 +4522,7 @@
       </p:grpSpPr>
       <p:sp>
         <p:nvSpPr>
-          <p:cNvPr id="452" name="Google Shape;452;g1267878ad62_0_198:notes"/>
+          <p:cNvPr id="453" name="Google Shape;453;g1267878ad62_0_198:notes"/>
           <p:cNvSpPr/>
           <p:nvPr>
             <p:ph idx="2" type="sldImg"/>
@@ -4557,7 +4557,7 @@
       </p:sp>
       <p:sp>
         <p:nvSpPr>
-          <p:cNvPr id="453" name="Google Shape;453;g1267878ad62_0_198:notes"/>
+          <p:cNvPr id="454" name="Google Shape;454;g1267878ad62_0_198:notes"/>
           <p:cNvSpPr txBox="1"/>
           <p:nvPr>
             <p:ph idx="1" type="body"/>
@@ -4695,7 +4695,7 @@
   <p:cSld>
     <p:spTree>
       <p:nvGrpSpPr>
-        <p:cNvPr id="459" name="Shape 459"/>
+        <p:cNvPr id="460" name="Shape 460"/>
         <p:cNvGrpSpPr/>
         <p:nvPr/>
       </p:nvGrpSpPr>
@@ -4709,7 +4709,7 @@
       </p:grpSpPr>
       <p:sp>
         <p:nvSpPr>
-          <p:cNvPr id="460" name="Google Shape;460;g116cbeaf380_0_235:notes"/>
+          <p:cNvPr id="461" name="Google Shape;461;g116cbeaf380_0_235:notes"/>
           <p:cNvSpPr/>
           <p:nvPr>
             <p:ph idx="2" type="sldImg"/>
@@ -4744,7 +4744,7 @@
       </p:sp>
       <p:sp>
         <p:nvSpPr>
-          <p:cNvPr id="461" name="Google Shape;461;g116cbeaf380_0_235:notes"/>
+          <p:cNvPr id="462" name="Google Shape;462;g116cbeaf380_0_235:notes"/>
           <p:cNvSpPr txBox="1"/>
           <p:nvPr>
             <p:ph idx="1" type="body"/>
@@ -4882,7 +4882,7 @@
   <p:cSld>
     <p:spTree>
       <p:nvGrpSpPr>
-        <p:cNvPr id="469" name="Shape 469"/>
+        <p:cNvPr id="470" name="Shape 470"/>
         <p:cNvGrpSpPr/>
         <p:nvPr/>
       </p:nvGrpSpPr>
@@ -4896,7 +4896,7 @@
       </p:grpSpPr>
       <p:sp>
         <p:nvSpPr>
-          <p:cNvPr id="470" name="Google Shape;470;g116cbeaf380_0_244:notes"/>
+          <p:cNvPr id="471" name="Google Shape;471;g116cbeaf380_0_244:notes"/>
           <p:cNvSpPr/>
           <p:nvPr>
             <p:ph idx="2" type="sldImg"/>
@@ -4931,7 +4931,7 @@
       </p:sp>
       <p:sp>
         <p:nvSpPr>
-          <p:cNvPr id="471" name="Google Shape;471;g116cbeaf380_0_244:notes"/>
+          <p:cNvPr id="472" name="Google Shape;472;g116cbeaf380_0_244:notes"/>
           <p:cNvSpPr txBox="1"/>
           <p:nvPr>
             <p:ph idx="1" type="body"/>
@@ -5069,7 +5069,7 @@
   <p:cSld>
     <p:spTree>
       <p:nvGrpSpPr>
-        <p:cNvPr id="479" name="Shape 479"/>
+        <p:cNvPr id="480" name="Shape 480"/>
         <p:cNvGrpSpPr/>
         <p:nvPr/>
       </p:nvGrpSpPr>
@@ -5083,7 +5083,7 @@
       </p:grpSpPr>
       <p:sp>
         <p:nvSpPr>
-          <p:cNvPr id="480" name="Google Shape;480;g12835890078_0_61:notes"/>
+          <p:cNvPr id="481" name="Google Shape;481;g12835890078_0_61:notes"/>
           <p:cNvSpPr/>
           <p:nvPr>
             <p:ph idx="2" type="sldImg"/>
@@ -5118,7 +5118,7 @@
       </p:sp>
       <p:sp>
         <p:nvSpPr>
-          <p:cNvPr id="481" name="Google Shape;481;g12835890078_0_61:notes"/>
+          <p:cNvPr id="482" name="Google Shape;482;g12835890078_0_61:notes"/>
           <p:cNvSpPr txBox="1"/>
           <p:nvPr>
             <p:ph idx="1" type="body"/>
@@ -5168,7 +5168,7 @@
   <p:cSld>
     <p:spTree>
       <p:nvGrpSpPr>
-        <p:cNvPr id="496" name="Shape 496"/>
+        <p:cNvPr id="497" name="Shape 497"/>
         <p:cNvGrpSpPr/>
         <p:nvPr/>
       </p:nvGrpSpPr>
@@ -5182,7 +5182,7 @@
       </p:grpSpPr>
       <p:sp>
         <p:nvSpPr>
-          <p:cNvPr id="497" name="Google Shape;497;g110cd4518f6_0_0:notes"/>
+          <p:cNvPr id="498" name="Google Shape;498;g110cd4518f6_0_0:notes"/>
           <p:cNvSpPr/>
           <p:nvPr>
             <p:ph idx="2" type="sldImg"/>
@@ -5217,7 +5217,7 @@
       </p:sp>
       <p:sp>
         <p:nvSpPr>
-          <p:cNvPr id="498" name="Google Shape;498;g110cd4518f6_0_0:notes"/>
+          <p:cNvPr id="499" name="Google Shape;499;g110cd4518f6_0_0:notes"/>
           <p:cNvSpPr txBox="1"/>
           <p:nvPr>
             <p:ph idx="1" type="body"/>
@@ -5267,7 +5267,7 @@
   <p:cSld>
     <p:spTree>
       <p:nvGrpSpPr>
-        <p:cNvPr id="195" name="Shape 195"/>
+        <p:cNvPr id="196" name="Shape 196"/>
         <p:cNvGrpSpPr/>
         <p:nvPr/>
       </p:nvGrpSpPr>
@@ -5281,7 +5281,7 @@
       </p:grpSpPr>
       <p:sp>
         <p:nvSpPr>
-          <p:cNvPr id="196" name="Google Shape;196;g1162bb18217_0_12:notes"/>
+          <p:cNvPr id="197" name="Google Shape;197;g1162bb18217_0_12:notes"/>
           <p:cNvSpPr/>
           <p:nvPr>
             <p:ph idx="2" type="sldImg"/>
@@ -5316,7 +5316,7 @@
       </p:sp>
       <p:sp>
         <p:nvSpPr>
-          <p:cNvPr id="197" name="Google Shape;197;g1162bb18217_0_12:notes"/>
+          <p:cNvPr id="198" name="Google Shape;198;g1162bb18217_0_12:notes"/>
           <p:cNvSpPr txBox="1"/>
           <p:nvPr>
             <p:ph idx="1" type="body"/>
@@ -5454,7 +5454,7 @@
   <p:cSld>
     <p:spTree>
       <p:nvGrpSpPr>
-        <p:cNvPr id="205" name="Shape 205"/>
+        <p:cNvPr id="206" name="Shape 206"/>
         <p:cNvGrpSpPr/>
         <p:nvPr/>
       </p:nvGrpSpPr>
@@ -5468,7 +5468,7 @@
       </p:grpSpPr>
       <p:sp>
         <p:nvSpPr>
-          <p:cNvPr id="206" name="Google Shape;206;g116cbeaf380_0_2:notes"/>
+          <p:cNvPr id="207" name="Google Shape;207;g116cbeaf380_0_2:notes"/>
           <p:cNvSpPr/>
           <p:nvPr>
             <p:ph idx="2" type="sldImg"/>
@@ -5503,7 +5503,7 @@
       </p:sp>
       <p:sp>
         <p:nvSpPr>
-          <p:cNvPr id="207" name="Google Shape;207;g116cbeaf380_0_2:notes"/>
+          <p:cNvPr id="208" name="Google Shape;208;g116cbeaf380_0_2:notes"/>
           <p:cNvSpPr txBox="1"/>
           <p:nvPr>
             <p:ph idx="1" type="body"/>
@@ -5641,7 +5641,7 @@
   <p:cSld>
     <p:spTree>
       <p:nvGrpSpPr>
-        <p:cNvPr id="215" name="Shape 215"/>
+        <p:cNvPr id="216" name="Shape 216"/>
         <p:cNvGrpSpPr/>
         <p:nvPr/>
       </p:nvGrpSpPr>
@@ -5655,7 +5655,7 @@
       </p:grpSpPr>
       <p:sp>
         <p:nvSpPr>
-          <p:cNvPr id="216" name="Google Shape;216;g116cbeaf380_0_11:notes"/>
+          <p:cNvPr id="217" name="Google Shape;217;g116cbeaf380_0_11:notes"/>
           <p:cNvSpPr/>
           <p:nvPr>
             <p:ph idx="2" type="sldImg"/>
@@ -5690,7 +5690,7 @@
       </p:sp>
       <p:sp>
         <p:nvSpPr>
-          <p:cNvPr id="217" name="Google Shape;217;g116cbeaf380_0_11:notes"/>
+          <p:cNvPr id="218" name="Google Shape;218;g116cbeaf380_0_11:notes"/>
           <p:cNvSpPr txBox="1"/>
           <p:nvPr>
             <p:ph idx="1" type="body"/>
@@ -5828,7 +5828,7 @@
   <p:cSld>
     <p:spTree>
       <p:nvGrpSpPr>
-        <p:cNvPr id="225" name="Shape 225"/>
+        <p:cNvPr id="226" name="Shape 226"/>
         <p:cNvGrpSpPr/>
         <p:nvPr/>
       </p:nvGrpSpPr>
@@ -5842,7 +5842,7 @@
       </p:grpSpPr>
       <p:sp>
         <p:nvSpPr>
-          <p:cNvPr id="226" name="Google Shape;226;g116cbeaf380_0_21:notes"/>
+          <p:cNvPr id="227" name="Google Shape;227;g116cbeaf380_0_21:notes"/>
           <p:cNvSpPr/>
           <p:nvPr>
             <p:ph idx="2" type="sldImg"/>
@@ -5877,7 +5877,7 @@
       </p:sp>
       <p:sp>
         <p:nvSpPr>
-          <p:cNvPr id="227" name="Google Shape;227;g116cbeaf380_0_21:notes"/>
+          <p:cNvPr id="228" name="Google Shape;228;g116cbeaf380_0_21:notes"/>
           <p:cNvSpPr txBox="1"/>
           <p:nvPr>
             <p:ph idx="1" type="body"/>
@@ -6015,7 +6015,7 @@
   <p:cSld>
     <p:spTree>
       <p:nvGrpSpPr>
-        <p:cNvPr id="235" name="Shape 235"/>
+        <p:cNvPr id="236" name="Shape 236"/>
         <p:cNvGrpSpPr/>
         <p:nvPr/>
       </p:nvGrpSpPr>
@@ -6029,7 +6029,7 @@
       </p:grpSpPr>
       <p:sp>
         <p:nvSpPr>
-          <p:cNvPr id="236" name="Google Shape;236;g116cbeaf380_0_30:notes"/>
+          <p:cNvPr id="237" name="Google Shape;237;g116cbeaf380_0_30:notes"/>
           <p:cNvSpPr/>
           <p:nvPr>
             <p:ph idx="2" type="sldImg"/>
@@ -6064,7 +6064,7 @@
       </p:sp>
       <p:sp>
         <p:nvSpPr>
-          <p:cNvPr id="237" name="Google Shape;237;g116cbeaf380_0_30:notes"/>
+          <p:cNvPr id="238" name="Google Shape;238;g116cbeaf380_0_30:notes"/>
           <p:cNvSpPr txBox="1"/>
           <p:nvPr>
             <p:ph idx="1" type="body"/>
@@ -6202,7 +6202,7 @@
   <p:cSld>
     <p:spTree>
       <p:nvGrpSpPr>
-        <p:cNvPr id="245" name="Shape 245"/>
+        <p:cNvPr id="246" name="Shape 246"/>
         <p:cNvGrpSpPr/>
         <p:nvPr/>
       </p:nvGrpSpPr>
@@ -6216,7 +6216,7 @@
       </p:grpSpPr>
       <p:sp>
         <p:nvSpPr>
-          <p:cNvPr id="246" name="Google Shape;246;g116cbeaf380_0_39:notes"/>
+          <p:cNvPr id="247" name="Google Shape;247;g116cbeaf380_0_39:notes"/>
           <p:cNvSpPr/>
           <p:nvPr>
             <p:ph idx="2" type="sldImg"/>
@@ -6251,7 +6251,7 @@
       </p:sp>
       <p:sp>
         <p:nvSpPr>
-          <p:cNvPr id="247" name="Google Shape;247;g116cbeaf380_0_39:notes"/>
+          <p:cNvPr id="248" name="Google Shape;248;g116cbeaf380_0_39:notes"/>
           <p:cNvSpPr txBox="1"/>
           <p:nvPr>
             <p:ph idx="1" type="body"/>
@@ -22714,6 +22714,34 @@
           </a:p>
         </p:txBody>
       </p:sp>
+      <p:pic>
+        <p:nvPicPr>
+          <p:cNvPr id="179" name="Google Shape;179;p37"/>
+          <p:cNvPicPr preferRelativeResize="0"/>
+          <p:nvPr/>
+        </p:nvPicPr>
+        <p:blipFill>
+          <a:blip r:embed="rId5">
+            <a:alphaModFix/>
+          </a:blip>
+          <a:stretch>
+            <a:fillRect/>
+          </a:stretch>
+        </p:blipFill>
+        <p:spPr>
+          <a:xfrm>
+            <a:off x="7959900" y="3603500"/>
+            <a:ext cx="872400" cy="872400"/>
+          </a:xfrm>
+          <a:prstGeom prst="rect">
+            <a:avLst/>
+          </a:prstGeom>
+          <a:noFill/>
+          <a:ln>
+            <a:noFill/>
+          </a:ln>
+        </p:spPr>
+      </p:pic>
     </p:spTree>
   </p:cSld>
   <p:clrMapOvr>
@@ -22727,7 +22755,7 @@
   <p:cSld>
     <p:spTree>
       <p:nvGrpSpPr>
-        <p:cNvPr id="258" name="Shape 258"/>
+        <p:cNvPr id="259" name="Shape 259"/>
         <p:cNvGrpSpPr/>
         <p:nvPr/>
       </p:nvGrpSpPr>
@@ -22741,7 +22769,568 @@
       </p:grpSpPr>
       <p:pic>
         <p:nvPicPr>
-          <p:cNvPr id="259" name="Google Shape;259;p46"/>
+          <p:cNvPr id="260" name="Google Shape;260;p46"/>
+          <p:cNvPicPr preferRelativeResize="0"/>
+          <p:nvPr/>
+        </p:nvPicPr>
+        <p:blipFill>
+          <a:blip r:embed="rId3">
+            <a:alphaModFix/>
+          </a:blip>
+          <a:stretch>
+            <a:fillRect/>
+          </a:stretch>
+        </p:blipFill>
+        <p:spPr>
+          <a:xfrm>
+            <a:off x="5265225" y="1751625"/>
+            <a:ext cx="3326700" cy="2111550"/>
+          </a:xfrm>
+          <a:prstGeom prst="rect">
+            <a:avLst/>
+          </a:prstGeom>
+          <a:noFill/>
+          <a:ln>
+            <a:noFill/>
+          </a:ln>
+        </p:spPr>
+      </p:pic>
+      <p:pic>
+        <p:nvPicPr>
+          <p:cNvPr id="261" name="Google Shape;261;p46"/>
+          <p:cNvPicPr preferRelativeResize="0"/>
+          <p:nvPr/>
+        </p:nvPicPr>
+        <p:blipFill>
+          <a:blip r:embed="rId4">
+            <a:alphaModFix/>
+          </a:blip>
+          <a:stretch>
+            <a:fillRect/>
+          </a:stretch>
+        </p:blipFill>
+        <p:spPr>
+          <a:xfrm>
+            <a:off x="0" y="4710300"/>
+            <a:ext cx="9144000" cy="433200"/>
+          </a:xfrm>
+          <a:prstGeom prst="rect">
+            <a:avLst/>
+          </a:prstGeom>
+          <a:noFill/>
+          <a:ln>
+            <a:noFill/>
+          </a:ln>
+        </p:spPr>
+      </p:pic>
+      <p:sp>
+        <p:nvSpPr>
+          <p:cNvPr id="262" name="Google Shape;262;p46"/>
+          <p:cNvSpPr txBox="1"/>
+          <p:nvPr>
+            <p:ph type="title"/>
+          </p:nvPr>
+        </p:nvSpPr>
+        <p:spPr>
+          <a:xfrm>
+            <a:off x="311700" y="109850"/>
+            <a:ext cx="8520600" cy="607800"/>
+          </a:xfrm>
+          <a:prstGeom prst="rect">
+            <a:avLst/>
+          </a:prstGeom>
+        </p:spPr>
+        <p:txBody>
+          <a:bodyPr anchorCtr="0" anchor="t" bIns="91425" lIns="91425" spcFirstLastPara="1" rIns="91425" wrap="square" tIns="91425">
+            <a:noAutofit/>
+          </a:bodyPr>
+          <a:lstStyle/>
+          <a:p>
+            <a:pPr indent="0" lvl="0" marL="0" rtl="0" algn="l">
+              <a:spcBef>
+                <a:spcPts val="0"/>
+              </a:spcBef>
+              <a:spcAft>
+                <a:spcPts val="0"/>
+              </a:spcAft>
+              <a:buNone/>
+            </a:pPr>
+            <a:r>
+              <a:rPr lang="en">
+                <a:solidFill>
+                  <a:srgbClr val="4A86E8"/>
+                </a:solidFill>
+              </a:rPr>
+              <a:t>Multilayer perceptron</a:t>
+            </a:r>
+            <a:r>
+              <a:rPr lang="en">
+                <a:solidFill>
+                  <a:srgbClr val="4A86E8"/>
+                </a:solidFill>
+              </a:rPr>
+              <a:t> (MLP)</a:t>
+            </a:r>
+            <a:endParaRPr>
+              <a:solidFill>
+                <a:srgbClr val="4A86E8"/>
+              </a:solidFill>
+            </a:endParaRPr>
+          </a:p>
+        </p:txBody>
+      </p:sp>
+      <p:sp>
+        <p:nvSpPr>
+          <p:cNvPr id="263" name="Google Shape;263;p46"/>
+          <p:cNvSpPr txBox="1"/>
+          <p:nvPr/>
+        </p:nvSpPr>
+        <p:spPr>
+          <a:xfrm>
+            <a:off x="311700" y="717650"/>
+            <a:ext cx="8520600" cy="3980400"/>
+          </a:xfrm>
+          <a:prstGeom prst="rect">
+            <a:avLst/>
+          </a:prstGeom>
+          <a:noFill/>
+          <a:ln>
+            <a:noFill/>
+          </a:ln>
+        </p:spPr>
+        <p:txBody>
+          <a:bodyPr anchorCtr="0" anchor="t" bIns="91425" lIns="91425" spcFirstLastPara="1" rIns="91425" wrap="square" tIns="91425">
+            <a:spAutoFit/>
+          </a:bodyPr>
+          <a:lstStyle/>
+          <a:p>
+            <a:pPr indent="0" lvl="0" marL="0" rtl="0" algn="l">
+              <a:lnSpc>
+                <a:spcPct val="115000"/>
+              </a:lnSpc>
+              <a:spcBef>
+                <a:spcPts val="0"/>
+              </a:spcBef>
+              <a:spcAft>
+                <a:spcPts val="0"/>
+              </a:spcAft>
+              <a:buNone/>
+            </a:pPr>
+            <a:r>
+              <a:rPr lang="en" sz="1200"/>
+              <a:t>Consists of nodes (shown as circles) that represent numbers: an input value, an output value or an internal (hidden) value. Nodes are arranged in layers with connections, indicating learned parameters, between every node of a layer and every node of the next layer. For example, molecular properties can be used to predict drug toxicity as the prediction can be made from some complicated combination of independent input features.</a:t>
+            </a:r>
+            <a:endParaRPr sz="1200"/>
+          </a:p>
+          <a:p>
+            <a:pPr indent="-304800" lvl="0" marL="457200" rtl="0" algn="l">
+              <a:lnSpc>
+                <a:spcPct val="115000"/>
+              </a:lnSpc>
+              <a:spcBef>
+                <a:spcPts val="0"/>
+              </a:spcBef>
+              <a:spcAft>
+                <a:spcPts val="0"/>
+              </a:spcAft>
+              <a:buSzPts val="1200"/>
+              <a:buChar char="●"/>
+            </a:pPr>
+            <a:r>
+              <a:rPr b="1" lang="en" sz="1200"/>
+              <a:t>Type of data</a:t>
+            </a:r>
+            <a:endParaRPr b="1" sz="1200"/>
+          </a:p>
+          <a:p>
+            <a:pPr indent="-304800" lvl="1" marL="914400" rtl="0" algn="l">
+              <a:lnSpc>
+                <a:spcPct val="115000"/>
+              </a:lnSpc>
+              <a:spcBef>
+                <a:spcPts val="0"/>
+              </a:spcBef>
+              <a:spcAft>
+                <a:spcPts val="0"/>
+              </a:spcAft>
+              <a:buSzPts val="1200"/>
+              <a:buChar char="○"/>
+            </a:pPr>
+            <a:r>
+              <a:rPr lang="en" sz="1200"/>
+              <a:t>Labelled</a:t>
+            </a:r>
+            <a:endParaRPr sz="1200"/>
+          </a:p>
+          <a:p>
+            <a:pPr indent="-304800" lvl="1" marL="914400" rtl="0" algn="l">
+              <a:lnSpc>
+                <a:spcPct val="115000"/>
+              </a:lnSpc>
+              <a:spcBef>
+                <a:spcPts val="0"/>
+              </a:spcBef>
+              <a:spcAft>
+                <a:spcPts val="0"/>
+              </a:spcAft>
+              <a:buSzPts val="1200"/>
+              <a:buChar char="○"/>
+            </a:pPr>
+            <a:r>
+              <a:rPr lang="en" sz="1200"/>
+              <a:t>Fixed number of features</a:t>
+            </a:r>
+            <a:endParaRPr sz="1200"/>
+          </a:p>
+          <a:p>
+            <a:pPr indent="-304800" lvl="0" marL="457200" rtl="0" algn="l">
+              <a:lnSpc>
+                <a:spcPct val="115000"/>
+              </a:lnSpc>
+              <a:spcBef>
+                <a:spcPts val="0"/>
+              </a:spcBef>
+              <a:spcAft>
+                <a:spcPts val="0"/>
+              </a:spcAft>
+              <a:buSzPts val="1200"/>
+              <a:buChar char="●"/>
+            </a:pPr>
+            <a:r>
+              <a:rPr b="1" lang="en" sz="1200"/>
+              <a:t>Example applications</a:t>
+            </a:r>
+            <a:endParaRPr b="1" sz="1200"/>
+          </a:p>
+          <a:p>
+            <a:pPr indent="-304800" lvl="1" marL="914400" rtl="0" algn="l">
+              <a:lnSpc>
+                <a:spcPct val="115000"/>
+              </a:lnSpc>
+              <a:spcBef>
+                <a:spcPts val="0"/>
+              </a:spcBef>
+              <a:spcAft>
+                <a:spcPts val="0"/>
+              </a:spcAft>
+              <a:buSzPts val="1200"/>
+              <a:buChar char="○"/>
+            </a:pPr>
+            <a:r>
+              <a:rPr lang="en" sz="1200"/>
+              <a:t>Protein secondary structure prediction</a:t>
+            </a:r>
+            <a:endParaRPr sz="1200"/>
+          </a:p>
+          <a:p>
+            <a:pPr indent="-304800" lvl="1" marL="914400" rtl="0" algn="l">
+              <a:lnSpc>
+                <a:spcPct val="115000"/>
+              </a:lnSpc>
+              <a:spcBef>
+                <a:spcPts val="0"/>
+              </a:spcBef>
+              <a:spcAft>
+                <a:spcPts val="0"/>
+              </a:spcAft>
+              <a:buSzPts val="1200"/>
+              <a:buChar char="○"/>
+            </a:pPr>
+            <a:r>
+              <a:rPr lang="en" sz="1200"/>
+              <a:t>Drug toxicity prediction</a:t>
+            </a:r>
+            <a:endParaRPr sz="1200"/>
+          </a:p>
+          <a:p>
+            <a:pPr indent="-304800" lvl="0" marL="457200" rtl="0" algn="l">
+              <a:lnSpc>
+                <a:spcPct val="115000"/>
+              </a:lnSpc>
+              <a:spcBef>
+                <a:spcPts val="0"/>
+              </a:spcBef>
+              <a:spcAft>
+                <a:spcPts val="0"/>
+              </a:spcAft>
+              <a:buSzPts val="1200"/>
+              <a:buChar char="●"/>
+            </a:pPr>
+            <a:r>
+              <a:rPr b="1" lang="en" sz="1200"/>
+              <a:t>Advantages</a:t>
+            </a:r>
+            <a:endParaRPr b="1" sz="1200"/>
+          </a:p>
+          <a:p>
+            <a:pPr indent="-304800" lvl="1" marL="914400" rtl="0" algn="l">
+              <a:lnSpc>
+                <a:spcPct val="115000"/>
+              </a:lnSpc>
+              <a:spcBef>
+                <a:spcPts val="0"/>
+              </a:spcBef>
+              <a:spcAft>
+                <a:spcPts val="0"/>
+              </a:spcAft>
+              <a:buSzPts val="1200"/>
+              <a:buChar char="○"/>
+            </a:pPr>
+            <a:r>
+              <a:rPr lang="en" sz="1200"/>
+              <a:t>Can fit datasets with fewer layers than other complex architectures </a:t>
+            </a:r>
+            <a:endParaRPr sz="1200"/>
+          </a:p>
+          <a:p>
+            <a:pPr indent="0" lvl="0" marL="914400" rtl="0" algn="l">
+              <a:lnSpc>
+                <a:spcPct val="115000"/>
+              </a:lnSpc>
+              <a:spcBef>
+                <a:spcPts val="0"/>
+              </a:spcBef>
+              <a:spcAft>
+                <a:spcPts val="0"/>
+              </a:spcAft>
+              <a:buNone/>
+            </a:pPr>
+            <a:r>
+              <a:rPr lang="en" sz="1200"/>
+              <a:t>such as convolutional neural networks</a:t>
+            </a:r>
+            <a:endParaRPr sz="1200"/>
+          </a:p>
+          <a:p>
+            <a:pPr indent="-304800" lvl="1" marL="914400" rtl="0" algn="l">
+              <a:lnSpc>
+                <a:spcPct val="115000"/>
+              </a:lnSpc>
+              <a:spcBef>
+                <a:spcPts val="0"/>
+              </a:spcBef>
+              <a:spcAft>
+                <a:spcPts val="0"/>
+              </a:spcAft>
+              <a:buSzPts val="1200"/>
+              <a:buChar char="○"/>
+            </a:pPr>
+            <a:r>
+              <a:rPr lang="en" sz="1200"/>
+              <a:t>Easier and faster to train</a:t>
+            </a:r>
+            <a:endParaRPr sz="1200"/>
+          </a:p>
+          <a:p>
+            <a:pPr indent="-304800" lvl="0" marL="457200" rtl="0" algn="l">
+              <a:lnSpc>
+                <a:spcPct val="115000"/>
+              </a:lnSpc>
+              <a:spcBef>
+                <a:spcPts val="0"/>
+              </a:spcBef>
+              <a:spcAft>
+                <a:spcPts val="0"/>
+              </a:spcAft>
+              <a:buSzPts val="1200"/>
+              <a:buChar char="●"/>
+            </a:pPr>
+            <a:r>
+              <a:rPr b="1" lang="en" sz="1200"/>
+              <a:t>Disadvantages</a:t>
+            </a:r>
+            <a:endParaRPr b="1" sz="1200"/>
+          </a:p>
+          <a:p>
+            <a:pPr indent="-304800" lvl="1" marL="914400" rtl="0" algn="l">
+              <a:lnSpc>
+                <a:spcPct val="115000"/>
+              </a:lnSpc>
+              <a:spcBef>
+                <a:spcPts val="0"/>
+              </a:spcBef>
+              <a:spcAft>
+                <a:spcPts val="0"/>
+              </a:spcAft>
+              <a:buSzPts val="1200"/>
+              <a:buChar char="○"/>
+            </a:pPr>
+            <a:r>
+              <a:rPr lang="en" sz="1200"/>
+              <a:t>Easy to overfit</a:t>
+            </a:r>
+            <a:endParaRPr sz="1200"/>
+          </a:p>
+          <a:p>
+            <a:pPr indent="-304800" lvl="1" marL="914400" rtl="0" algn="l">
+              <a:lnSpc>
+                <a:spcPct val="115000"/>
+              </a:lnSpc>
+              <a:spcBef>
+                <a:spcPts val="0"/>
+              </a:spcBef>
+              <a:spcAft>
+                <a:spcPts val="0"/>
+              </a:spcAft>
+              <a:buSzPts val="1200"/>
+              <a:buChar char="○"/>
+            </a:pPr>
+            <a:r>
+              <a:rPr lang="en" sz="1200"/>
+              <a:t>Large number of parameters</a:t>
+            </a:r>
+            <a:endParaRPr sz="1200"/>
+          </a:p>
+          <a:p>
+            <a:pPr indent="-304800" lvl="1" marL="914400" rtl="0" algn="l">
+              <a:lnSpc>
+                <a:spcPct val="115000"/>
+              </a:lnSpc>
+              <a:spcBef>
+                <a:spcPts val="0"/>
+              </a:spcBef>
+              <a:spcAft>
+                <a:spcPts val="0"/>
+              </a:spcAft>
+              <a:buSzPts val="1200"/>
+              <a:buChar char="○"/>
+            </a:pPr>
+            <a:r>
+              <a:rPr lang="en" sz="1200"/>
+              <a:t>Hard to interpret</a:t>
+            </a:r>
+            <a:endParaRPr sz="1200"/>
+          </a:p>
+        </p:txBody>
+      </p:sp>
+      <p:sp>
+        <p:nvSpPr>
+          <p:cNvPr id="264" name="Google Shape;264;p46"/>
+          <p:cNvSpPr txBox="1"/>
+          <p:nvPr>
+            <p:ph idx="12" type="sldNum"/>
+          </p:nvPr>
+        </p:nvSpPr>
+        <p:spPr>
+          <a:xfrm>
+            <a:off x="6" y="4730090"/>
+            <a:ext cx="548700" cy="393600"/>
+          </a:xfrm>
+          <a:prstGeom prst="rect">
+            <a:avLst/>
+          </a:prstGeom>
+        </p:spPr>
+        <p:txBody>
+          <a:bodyPr anchorCtr="0" anchor="ctr" bIns="91425" lIns="91425" spcFirstLastPara="1" rIns="91425" wrap="square" tIns="91425">
+            <a:noAutofit/>
+          </a:bodyPr>
+          <a:lstStyle/>
+          <a:p>
+            <a:pPr indent="0" lvl="0" marL="0" rtl="0" algn="r">
+              <a:spcBef>
+                <a:spcPts val="0"/>
+              </a:spcBef>
+              <a:spcAft>
+                <a:spcPts val="0"/>
+              </a:spcAft>
+              <a:buNone/>
+            </a:pPr>
+            <a:fld id="{00000000-1234-1234-1234-123412341234}" type="slidenum">
+              <a:rPr lang="en">
+                <a:solidFill>
+                  <a:schemeClr val="lt1"/>
+                </a:solidFill>
+              </a:rPr>
+              <a:t>‹#›</a:t>
+            </a:fld>
+            <a:endParaRPr>
+              <a:solidFill>
+                <a:schemeClr val="lt1"/>
+              </a:solidFill>
+            </a:endParaRPr>
+          </a:p>
+        </p:txBody>
+      </p:sp>
+      <p:sp>
+        <p:nvSpPr>
+          <p:cNvPr id="265" name="Google Shape;265;p46"/>
+          <p:cNvSpPr txBox="1"/>
+          <p:nvPr/>
+        </p:nvSpPr>
+        <p:spPr>
+          <a:xfrm>
+            <a:off x="6115313" y="3930725"/>
+            <a:ext cx="1989300" cy="400200"/>
+          </a:xfrm>
+          <a:prstGeom prst="rect">
+            <a:avLst/>
+          </a:prstGeom>
+          <a:noFill/>
+          <a:ln>
+            <a:noFill/>
+          </a:ln>
+        </p:spPr>
+        <p:txBody>
+          <a:bodyPr anchorCtr="0" anchor="t" bIns="91425" lIns="91425" spcFirstLastPara="1" rIns="91425" wrap="square" tIns="91425">
+            <a:spAutoFit/>
+          </a:bodyPr>
+          <a:lstStyle/>
+          <a:p>
+            <a:pPr indent="0" lvl="0" marL="0" rtl="0" algn="ctr">
+              <a:spcBef>
+                <a:spcPts val="0"/>
+              </a:spcBef>
+              <a:spcAft>
+                <a:spcPts val="0"/>
+              </a:spcAft>
+              <a:buNone/>
+            </a:pPr>
+            <a:r>
+              <a:rPr lang="en">
+                <a:latin typeface="Roboto"/>
+                <a:ea typeface="Roboto"/>
+                <a:cs typeface="Roboto"/>
+                <a:sym typeface="Roboto"/>
+              </a:rPr>
+              <a:t>(Greener et al. 2022)</a:t>
+            </a:r>
+            <a:endParaRPr>
+              <a:latin typeface="Roboto"/>
+              <a:ea typeface="Roboto"/>
+              <a:cs typeface="Roboto"/>
+              <a:sym typeface="Roboto"/>
+            </a:endParaRPr>
+          </a:p>
+        </p:txBody>
+      </p:sp>
+    </p:spTree>
+  </p:cSld>
+  <p:clrMapOvr>
+    <a:masterClrMapping/>
+  </p:clrMapOvr>
+</p:sld>
+</file>
+
+<file path=ppt/slides/slide11.xml><?xml version="1.0" encoding="utf-8"?>
+<p:sld xmlns:a="http://schemas.openxmlformats.org/drawingml/2006/main" xmlns:r="http://schemas.openxmlformats.org/officeDocument/2006/relationships" xmlns:mc="http://schemas.openxmlformats.org/markup-compatibility/2006" xmlns:mv="urn:schemas-microsoft-com:mac:vml" xmlns:p="http://schemas.openxmlformats.org/presentationml/2006/main" xmlns:c="http://schemas.openxmlformats.org/drawingml/2006/chart" xmlns:dgm="http://schemas.openxmlformats.org/drawingml/2006/diagram" xmlns:o="urn:schemas-microsoft-com:office:office" xmlns:v="urn:schemas-microsoft-com:vml" xmlns:pvml="urn:schemas-microsoft-com:office:powerpoint" xmlns:com="http://schemas.openxmlformats.org/drawingml/2006/compatibility" xmlns:p14="http://schemas.microsoft.com/office/powerpoint/2010/main" xmlns:p15="http://schemas.microsoft.com/office/powerpoint/2012/main" xmlns:ahyp="http://schemas.microsoft.com/office/drawing/2018/hyperlinkcolor">
+  <p:cSld>
+    <p:spTree>
+      <p:nvGrpSpPr>
+        <p:cNvPr id="269" name="Shape 269"/>
+        <p:cNvGrpSpPr/>
+        <p:nvPr/>
+      </p:nvGrpSpPr>
+      <p:grpSpPr>
+        <a:xfrm>
+          <a:off x="0" y="0"/>
+          <a:ext cx="0" cy="0"/>
+          <a:chOff x="0" y="0"/>
+          <a:chExt cx="0" cy="0"/>
+        </a:xfrm>
+      </p:grpSpPr>
+      <p:pic>
+        <p:nvPicPr>
+          <p:cNvPr id="270" name="Google Shape;270;p47"/>
           <p:cNvPicPr preferRelativeResize="0"/>
           <p:nvPr/>
         </p:nvPicPr>
@@ -22769,7 +23358,7 @@
       </p:pic>
       <p:sp>
         <p:nvSpPr>
-          <p:cNvPr id="260" name="Google Shape;260;p46"/>
+          <p:cNvPr id="271" name="Google Shape;271;p47"/>
           <p:cNvSpPr txBox="1"/>
           <p:nvPr>
             <p:ph type="title"/>
@@ -22805,15 +23394,7 @@
                   <a:srgbClr val="4A86E8"/>
                 </a:solidFill>
               </a:rPr>
-              <a:t>Multilayer perceptron</a:t>
-            </a:r>
-            <a:r>
-              <a:rPr lang="en">
-                <a:solidFill>
-                  <a:srgbClr val="4A86E8"/>
-                </a:solidFill>
-              </a:rPr>
-              <a:t> (MLP)</a:t>
+              <a:t>Convolutional neural network (CNN)</a:t>
             </a:r>
             <a:endParaRPr>
               <a:solidFill>
@@ -22825,13 +23406,13 @@
       </p:sp>
       <p:sp>
         <p:nvSpPr>
-          <p:cNvPr id="261" name="Google Shape;261;p46"/>
+          <p:cNvPr id="272" name="Google Shape;272;p47"/>
           <p:cNvSpPr txBox="1"/>
           <p:nvPr/>
         </p:nvSpPr>
         <p:spPr>
           <a:xfrm>
-            <a:off x="311700" y="717650"/>
+            <a:off x="311700" y="617475"/>
             <a:ext cx="8520600" cy="3980400"/>
           </a:xfrm>
           <a:prstGeom prst="rect">
@@ -22862,7 +23443,7 @@
             </a:pPr>
             <a:r>
               <a:rPr lang="en" sz="1200"/>
-              <a:t>Consists of nodes (shown as circles) that represent numbers: an input value, an output value or an internal (hidden) value. Nodes are arranged in layers with connections, indicating learned parameters, between every node of a layer and every node of the next layer. For example, molecular properties can be used to predict drug toxicity as the prediction can be made from some complicated combination of independent input features.</a:t>
+              <a:t>Uses filters that move across the input layer to calculate the values in the next layer. The filters operating across the whole layer mean that parameters are shared, allowing similar entities to be detected regardless of location. A 2D CNN is shown operating on a microscopy image, but 1D and 3D CNNs also find applications in biology. For example, biological sequences can be considered 1D and magnetic resonance imaging data can be considered 3D.</a:t>
             </a:r>
             <a:endParaRPr sz="1200"/>
           </a:p>
@@ -22902,7 +23483,26 @@
             </a:pPr>
             <a:r>
               <a:rPr lang="en" sz="1200"/>
-              <a:t>Labelled</a:t>
+              <a:t>Spatial data arranged in a grid. e.g. 2D image (pixels), </a:t>
+            </a:r>
+            <a:endParaRPr sz="1200"/>
+          </a:p>
+          <a:p>
+            <a:pPr indent="0" lvl="0" marL="914400" rtl="0" algn="l">
+              <a:lnSpc>
+                <a:spcPct val="115000"/>
+              </a:lnSpc>
+              <a:spcBef>
+                <a:spcPts val="0"/>
+              </a:spcBef>
+              <a:spcAft>
+                <a:spcPts val="0"/>
+              </a:spcAft>
+              <a:buNone/>
+            </a:pPr>
+            <a:r>
+              <a:rPr lang="en" sz="1200"/>
+              <a:t>3D volumes (voxels)</a:t>
             </a:r>
             <a:endParaRPr sz="1200"/>
           </a:p>
@@ -22922,7 +23522,7 @@
             </a:pPr>
             <a:r>
               <a:rPr lang="en" sz="1200"/>
-              <a:t>Fixed number of features</a:t>
+              <a:t>Allows variable input size</a:t>
             </a:r>
             <a:endParaRPr sz="1200"/>
           </a:p>
@@ -22962,7 +23562,7 @@
             </a:pPr>
             <a:r>
               <a:rPr lang="en" sz="1200"/>
-              <a:t>Protein secondary structure prediction</a:t>
+              <a:t>Protein residue-residue contact and distance prediction</a:t>
             </a:r>
             <a:endParaRPr sz="1200"/>
           </a:p>
@@ -22982,7 +23582,7 @@
             </a:pPr>
             <a:r>
               <a:rPr lang="en" sz="1200"/>
-              <a:t>Drug toxicity prediction</a:t>
+              <a:t>Medical image recognition</a:t>
             </a:r>
             <a:endParaRPr sz="1200"/>
           </a:p>
@@ -23022,26 +23622,7 @@
             </a:pPr>
             <a:r>
               <a:rPr lang="en" sz="1200"/>
-              <a:t>Can fit datasets with fewer layers than architectures </a:t>
-            </a:r>
-            <a:endParaRPr sz="1200"/>
-          </a:p>
-          <a:p>
-            <a:pPr indent="0" lvl="0" marL="914400" rtl="0" algn="l">
-              <a:lnSpc>
-                <a:spcPct val="115000"/>
-              </a:lnSpc>
-              <a:spcBef>
-                <a:spcPts val="0"/>
-              </a:spcBef>
-              <a:spcAft>
-                <a:spcPts val="0"/>
-              </a:spcAft>
-              <a:buNone/>
-            </a:pPr>
-            <a:r>
-              <a:rPr lang="en" sz="1200"/>
-              <a:t>such as convolutional neural networks</a:t>
+              <a:t>Variable input size</a:t>
             </a:r>
             <a:endParaRPr sz="1200"/>
           </a:p>
@@ -23061,7 +23642,7 @@
             </a:pPr>
             <a:r>
               <a:rPr lang="en" sz="1200"/>
-              <a:t>Easier and faster to train</a:t>
+              <a:t>Learns patterns irrespective of location in input</a:t>
             </a:r>
             <a:endParaRPr sz="1200"/>
           </a:p>
@@ -23101,7 +23682,7 @@
             </a:pPr>
             <a:r>
               <a:rPr lang="en" sz="1200"/>
-              <a:t>Easy to overfit</a:t>
+              <a:t>The amount of input that is considered when predicting the output for each pixel can be limited.</a:t>
             </a:r>
             <a:endParaRPr sz="1200"/>
           </a:p>
@@ -23121,27 +23702,7 @@
             </a:pPr>
             <a:r>
               <a:rPr lang="en" sz="1200"/>
-              <a:t>Large number of parameters</a:t>
-            </a:r>
-            <a:endParaRPr sz="1200"/>
-          </a:p>
-          <a:p>
-            <a:pPr indent="-304800" lvl="1" marL="914400" rtl="0" algn="l">
-              <a:lnSpc>
-                <a:spcPct val="115000"/>
-              </a:lnSpc>
-              <a:spcBef>
-                <a:spcPts val="0"/>
-              </a:spcBef>
-              <a:spcAft>
-                <a:spcPts val="0"/>
-              </a:spcAft>
-              <a:buSzPts val="1200"/>
-              <a:buChar char="○"/>
-            </a:pPr>
-            <a:r>
-              <a:rPr lang="en" sz="1200"/>
-              <a:t>Hard to interpret</a:t>
+              <a:t>Hard to train deeper architectures that use many layers to increase the receptive field and make more complex predictions</a:t>
             </a:r>
             <a:endParaRPr sz="1200"/>
           </a:p>
@@ -23149,7 +23710,7 @@
       </p:sp>
       <p:sp>
         <p:nvSpPr>
-          <p:cNvPr id="262" name="Google Shape;262;p46"/>
+          <p:cNvPr id="273" name="Google Shape;273;p47"/>
           <p:cNvSpPr txBox="1"/>
           <p:nvPr>
             <p:ph idx="12" type="sldNum"/>
@@ -23195,16 +23756,44 @@
           </a:p>
         </p:txBody>
       </p:sp>
+      <p:pic>
+        <p:nvPicPr>
+          <p:cNvPr id="274" name="Google Shape;274;p47"/>
+          <p:cNvPicPr preferRelativeResize="0"/>
+          <p:nvPr/>
+        </p:nvPicPr>
+        <p:blipFill>
+          <a:blip r:embed="rId4">
+            <a:alphaModFix/>
+          </a:blip>
+          <a:stretch>
+            <a:fillRect/>
+          </a:stretch>
+        </p:blipFill>
+        <p:spPr>
+          <a:xfrm>
+            <a:off x="5444100" y="1576550"/>
+            <a:ext cx="3059275" cy="2274850"/>
+          </a:xfrm>
+          <a:prstGeom prst="rect">
+            <a:avLst/>
+          </a:prstGeom>
+          <a:noFill/>
+          <a:ln>
+            <a:noFill/>
+          </a:ln>
+        </p:spPr>
+      </p:pic>
       <p:sp>
         <p:nvSpPr>
-          <p:cNvPr id="263" name="Google Shape;263;p46"/>
+          <p:cNvPr id="275" name="Google Shape;275;p47"/>
           <p:cNvSpPr txBox="1"/>
           <p:nvPr/>
         </p:nvSpPr>
         <p:spPr>
           <a:xfrm>
-            <a:off x="6115313" y="3930725"/>
-            <a:ext cx="1989300" cy="400200"/>
+            <a:off x="5336013" y="3421150"/>
+            <a:ext cx="1989300" cy="354000"/>
           </a:xfrm>
           <a:prstGeom prst="rect">
             <a:avLst/>
@@ -23230,7 +23819,7 @@
               <a:buNone/>
             </a:pPr>
             <a:r>
-              <a:rPr lang="en">
+              <a:rPr lang="en" sz="1100">
                 <a:latin typeface="Roboto"/>
                 <a:ea typeface="Roboto"/>
                 <a:cs typeface="Roboto"/>
@@ -23238,7 +23827,7 @@
               </a:rPr>
               <a:t>(Greener et al. 2022)</a:t>
             </a:r>
-            <a:endParaRPr>
+            <a:endParaRPr sz="1100">
               <a:latin typeface="Roboto"/>
               <a:ea typeface="Roboto"/>
               <a:cs typeface="Roboto"/>
@@ -23247,34 +23836,6 @@
           </a:p>
         </p:txBody>
       </p:sp>
-      <p:pic>
-        <p:nvPicPr>
-          <p:cNvPr id="264" name="Google Shape;264;p46"/>
-          <p:cNvPicPr preferRelativeResize="0"/>
-          <p:nvPr/>
-        </p:nvPicPr>
-        <p:blipFill>
-          <a:blip r:embed="rId4">
-            <a:alphaModFix/>
-          </a:blip>
-          <a:stretch>
-            <a:fillRect/>
-          </a:stretch>
-        </p:blipFill>
-        <p:spPr>
-          <a:xfrm>
-            <a:off x="5265225" y="1751625"/>
-            <a:ext cx="3326700" cy="2111550"/>
-          </a:xfrm>
-          <a:prstGeom prst="rect">
-            <a:avLst/>
-          </a:prstGeom>
-          <a:noFill/>
-          <a:ln>
-            <a:noFill/>
-          </a:ln>
-        </p:spPr>
-      </p:pic>
     </p:spTree>
   </p:cSld>
   <p:clrMapOvr>
@@ -23283,12 +23844,12 @@
 </p:sld>
 </file>
 
-<file path=ppt/slides/slide11.xml><?xml version="1.0" encoding="utf-8"?>
+<file path=ppt/slides/slide12.xml><?xml version="1.0" encoding="utf-8"?>
 <p:sld xmlns:a="http://schemas.openxmlformats.org/drawingml/2006/main" xmlns:r="http://schemas.openxmlformats.org/officeDocument/2006/relationships" xmlns:mc="http://schemas.openxmlformats.org/markup-compatibility/2006" xmlns:mv="urn:schemas-microsoft-com:mac:vml" xmlns:p="http://schemas.openxmlformats.org/presentationml/2006/main" xmlns:c="http://schemas.openxmlformats.org/drawingml/2006/chart" xmlns:dgm="http://schemas.openxmlformats.org/drawingml/2006/diagram" xmlns:o="urn:schemas-microsoft-com:office:office" xmlns:v="urn:schemas-microsoft-com:vml" xmlns:pvml="urn:schemas-microsoft-com:office:powerpoint" xmlns:com="http://schemas.openxmlformats.org/drawingml/2006/compatibility" xmlns:p14="http://schemas.microsoft.com/office/powerpoint/2010/main" xmlns:p15="http://schemas.microsoft.com/office/powerpoint/2012/main" xmlns:ahyp="http://schemas.microsoft.com/office/drawing/2018/hyperlinkcolor">
   <p:cSld>
     <p:spTree>
       <p:nvGrpSpPr>
-        <p:cNvPr id="268" name="Shape 268"/>
+        <p:cNvPr id="279" name="Shape 279"/>
         <p:cNvGrpSpPr/>
         <p:nvPr/>
       </p:nvGrpSpPr>
@@ -23302,7 +23863,7 @@
       </p:grpSpPr>
       <p:pic>
         <p:nvPicPr>
-          <p:cNvPr id="269" name="Google Shape;269;p47"/>
+          <p:cNvPr id="280" name="Google Shape;280;p48"/>
           <p:cNvPicPr preferRelativeResize="0"/>
           <p:nvPr/>
         </p:nvPicPr>
@@ -23330,7 +23891,7 @@
       </p:pic>
       <p:sp>
         <p:nvSpPr>
-          <p:cNvPr id="270" name="Google Shape;270;p47"/>
+          <p:cNvPr id="281" name="Google Shape;281;p48"/>
           <p:cNvSpPr txBox="1"/>
           <p:nvPr>
             <p:ph type="title"/>
@@ -23366,539 +23927,6 @@
                   <a:srgbClr val="4A86E8"/>
                 </a:solidFill>
               </a:rPr>
-              <a:t>Convolutional neural network (CNN)</a:t>
-            </a:r>
-            <a:endParaRPr>
-              <a:solidFill>
-                <a:srgbClr val="4A86E8"/>
-              </a:solidFill>
-            </a:endParaRPr>
-          </a:p>
-        </p:txBody>
-      </p:sp>
-      <p:sp>
-        <p:nvSpPr>
-          <p:cNvPr id="271" name="Google Shape;271;p47"/>
-          <p:cNvSpPr txBox="1"/>
-          <p:nvPr/>
-        </p:nvSpPr>
-        <p:spPr>
-          <a:xfrm>
-            <a:off x="311700" y="617475"/>
-            <a:ext cx="8520600" cy="4192800"/>
-          </a:xfrm>
-          <a:prstGeom prst="rect">
-            <a:avLst/>
-          </a:prstGeom>
-          <a:noFill/>
-          <a:ln>
-            <a:noFill/>
-          </a:ln>
-        </p:spPr>
-        <p:txBody>
-          <a:bodyPr anchorCtr="0" anchor="t" bIns="91425" lIns="91425" spcFirstLastPara="1" rIns="91425" wrap="square" tIns="91425">
-            <a:spAutoFit/>
-          </a:bodyPr>
-          <a:lstStyle/>
-          <a:p>
-            <a:pPr indent="0" lvl="0" marL="0" rtl="0" algn="l">
-              <a:lnSpc>
-                <a:spcPct val="115000"/>
-              </a:lnSpc>
-              <a:spcBef>
-                <a:spcPts val="0"/>
-              </a:spcBef>
-              <a:spcAft>
-                <a:spcPts val="0"/>
-              </a:spcAft>
-              <a:buNone/>
-            </a:pPr>
-            <a:r>
-              <a:rPr lang="en" sz="1200"/>
-              <a:t>Uses filters that move across the input layer and are used to calculate the values in the next layer. The filters operating across the whole layer mean that parameters are shared, allowing similar entities to be detected regardless of location. A 2D CNN is shown operating on a microscopy image, but 1D and 3D CNNs also find applications in biology. For example, biological sequences can be considered 1D and magnetic resonance imaging data can be considered 3D.</a:t>
-            </a:r>
-            <a:endParaRPr sz="1200"/>
-          </a:p>
-          <a:p>
-            <a:pPr indent="-304800" lvl="0" marL="457200" rtl="0" algn="l">
-              <a:lnSpc>
-                <a:spcPct val="115000"/>
-              </a:lnSpc>
-              <a:spcBef>
-                <a:spcPts val="0"/>
-              </a:spcBef>
-              <a:spcAft>
-                <a:spcPts val="0"/>
-              </a:spcAft>
-              <a:buSzPts val="1200"/>
-              <a:buChar char="●"/>
-            </a:pPr>
-            <a:r>
-              <a:rPr b="1" lang="en" sz="1200"/>
-              <a:t>Type of data</a:t>
-            </a:r>
-            <a:endParaRPr b="1" sz="1200"/>
-          </a:p>
-          <a:p>
-            <a:pPr indent="-304800" lvl="1" marL="914400" rtl="0" algn="l">
-              <a:lnSpc>
-                <a:spcPct val="115000"/>
-              </a:lnSpc>
-              <a:spcBef>
-                <a:spcPts val="0"/>
-              </a:spcBef>
-              <a:spcAft>
-                <a:spcPts val="0"/>
-              </a:spcAft>
-              <a:buSzPts val="1200"/>
-              <a:buChar char="○"/>
-            </a:pPr>
-            <a:r>
-              <a:rPr lang="en" sz="1200"/>
-              <a:t>Spatial data arranged in a grid. e.g. 2D image (pixels), </a:t>
-            </a:r>
-            <a:endParaRPr sz="1200"/>
-          </a:p>
-          <a:p>
-            <a:pPr indent="0" lvl="0" marL="914400" rtl="0" algn="l">
-              <a:lnSpc>
-                <a:spcPct val="115000"/>
-              </a:lnSpc>
-              <a:spcBef>
-                <a:spcPts val="0"/>
-              </a:spcBef>
-              <a:spcAft>
-                <a:spcPts val="0"/>
-              </a:spcAft>
-              <a:buNone/>
-            </a:pPr>
-            <a:r>
-              <a:rPr lang="en" sz="1200"/>
-              <a:t>3D volumes (voxels)</a:t>
-            </a:r>
-            <a:endParaRPr sz="1200"/>
-          </a:p>
-          <a:p>
-            <a:pPr indent="-304800" lvl="1" marL="914400" rtl="0" algn="l">
-              <a:lnSpc>
-                <a:spcPct val="115000"/>
-              </a:lnSpc>
-              <a:spcBef>
-                <a:spcPts val="0"/>
-              </a:spcBef>
-              <a:spcAft>
-                <a:spcPts val="0"/>
-              </a:spcAft>
-              <a:buSzPts val="1200"/>
-              <a:buChar char="○"/>
-            </a:pPr>
-            <a:r>
-              <a:rPr lang="en" sz="1200"/>
-              <a:t>Allows variable input size</a:t>
-            </a:r>
-            <a:endParaRPr sz="1200"/>
-          </a:p>
-          <a:p>
-            <a:pPr indent="-304800" lvl="0" marL="457200" rtl="0" algn="l">
-              <a:lnSpc>
-                <a:spcPct val="115000"/>
-              </a:lnSpc>
-              <a:spcBef>
-                <a:spcPts val="0"/>
-              </a:spcBef>
-              <a:spcAft>
-                <a:spcPts val="0"/>
-              </a:spcAft>
-              <a:buSzPts val="1200"/>
-              <a:buChar char="●"/>
-            </a:pPr>
-            <a:r>
-              <a:rPr b="1" lang="en" sz="1200"/>
-              <a:t>Example applications</a:t>
-            </a:r>
-            <a:endParaRPr b="1" sz="1200"/>
-          </a:p>
-          <a:p>
-            <a:pPr indent="-304800" lvl="1" marL="914400" rtl="0" algn="l">
-              <a:lnSpc>
-                <a:spcPct val="115000"/>
-              </a:lnSpc>
-              <a:spcBef>
-                <a:spcPts val="0"/>
-              </a:spcBef>
-              <a:spcAft>
-                <a:spcPts val="0"/>
-              </a:spcAft>
-              <a:buSzPts val="1200"/>
-              <a:buChar char="○"/>
-            </a:pPr>
-            <a:r>
-              <a:rPr lang="en" sz="1200"/>
-              <a:t>Protein residue-residue contact and distance prediction</a:t>
-            </a:r>
-            <a:endParaRPr sz="1200"/>
-          </a:p>
-          <a:p>
-            <a:pPr indent="-304800" lvl="1" marL="914400" rtl="0" algn="l">
-              <a:lnSpc>
-                <a:spcPct val="115000"/>
-              </a:lnSpc>
-              <a:spcBef>
-                <a:spcPts val="0"/>
-              </a:spcBef>
-              <a:spcAft>
-                <a:spcPts val="0"/>
-              </a:spcAft>
-              <a:buSzPts val="1200"/>
-              <a:buChar char="○"/>
-            </a:pPr>
-            <a:r>
-              <a:rPr lang="en" sz="1200"/>
-              <a:t>Medical image recognition</a:t>
-            </a:r>
-            <a:endParaRPr sz="1200"/>
-          </a:p>
-          <a:p>
-            <a:pPr indent="-304800" lvl="0" marL="457200" rtl="0" algn="l">
-              <a:lnSpc>
-                <a:spcPct val="115000"/>
-              </a:lnSpc>
-              <a:spcBef>
-                <a:spcPts val="0"/>
-              </a:spcBef>
-              <a:spcAft>
-                <a:spcPts val="0"/>
-              </a:spcAft>
-              <a:buSzPts val="1200"/>
-              <a:buChar char="●"/>
-            </a:pPr>
-            <a:r>
-              <a:rPr b="1" lang="en" sz="1200"/>
-              <a:t>Advantages</a:t>
-            </a:r>
-            <a:endParaRPr b="1" sz="1200"/>
-          </a:p>
-          <a:p>
-            <a:pPr indent="-304800" lvl="1" marL="914400" rtl="0" algn="l">
-              <a:lnSpc>
-                <a:spcPct val="115000"/>
-              </a:lnSpc>
-              <a:spcBef>
-                <a:spcPts val="0"/>
-              </a:spcBef>
-              <a:spcAft>
-                <a:spcPts val="0"/>
-              </a:spcAft>
-              <a:buSzPts val="1200"/>
-              <a:buChar char="○"/>
-            </a:pPr>
-            <a:r>
-              <a:rPr lang="en" sz="1200"/>
-              <a:t>Variable input size</a:t>
-            </a:r>
-            <a:endParaRPr sz="1200"/>
-          </a:p>
-          <a:p>
-            <a:pPr indent="-304800" lvl="1" marL="914400" rtl="0" algn="l">
-              <a:lnSpc>
-                <a:spcPct val="115000"/>
-              </a:lnSpc>
-              <a:spcBef>
-                <a:spcPts val="0"/>
-              </a:spcBef>
-              <a:spcAft>
-                <a:spcPts val="0"/>
-              </a:spcAft>
-              <a:buSzPts val="1200"/>
-              <a:buChar char="○"/>
-            </a:pPr>
-            <a:r>
-              <a:rPr lang="en" sz="1200"/>
-              <a:t>Learns patterns irrespective of location in input</a:t>
-            </a:r>
-            <a:endParaRPr sz="1200"/>
-          </a:p>
-          <a:p>
-            <a:pPr indent="-304800" lvl="0" marL="457200" rtl="0" algn="l">
-              <a:lnSpc>
-                <a:spcPct val="115000"/>
-              </a:lnSpc>
-              <a:spcBef>
-                <a:spcPts val="0"/>
-              </a:spcBef>
-              <a:spcAft>
-                <a:spcPts val="0"/>
-              </a:spcAft>
-              <a:buSzPts val="1200"/>
-              <a:buChar char="●"/>
-            </a:pPr>
-            <a:r>
-              <a:rPr b="1" lang="en" sz="1200"/>
-              <a:t>Disadvantages</a:t>
-            </a:r>
-            <a:endParaRPr b="1" sz="1200"/>
-          </a:p>
-          <a:p>
-            <a:pPr indent="-304800" lvl="1" marL="914400" rtl="0" algn="l">
-              <a:lnSpc>
-                <a:spcPct val="115000"/>
-              </a:lnSpc>
-              <a:spcBef>
-                <a:spcPts val="0"/>
-              </a:spcBef>
-              <a:spcAft>
-                <a:spcPts val="0"/>
-              </a:spcAft>
-              <a:buSzPts val="1200"/>
-              <a:buChar char="○"/>
-            </a:pPr>
-            <a:r>
-              <a:rPr lang="en" sz="1200"/>
-              <a:t>Receptive field, the amount of input that is considered when predicting the output for each pixel can be limited.</a:t>
-            </a:r>
-            <a:endParaRPr sz="1200"/>
-          </a:p>
-          <a:p>
-            <a:pPr indent="-304800" lvl="1" marL="914400" rtl="0" algn="l">
-              <a:lnSpc>
-                <a:spcPct val="115000"/>
-              </a:lnSpc>
-              <a:spcBef>
-                <a:spcPts val="0"/>
-              </a:spcBef>
-              <a:spcAft>
-                <a:spcPts val="0"/>
-              </a:spcAft>
-              <a:buSzPts val="1200"/>
-              <a:buChar char="○"/>
-            </a:pPr>
-            <a:r>
-              <a:rPr lang="en" sz="1200"/>
-              <a:t>Hard to train deeper architectures that use many layers to increase the receptive field and make more complex predictions</a:t>
-            </a:r>
-            <a:endParaRPr sz="1200"/>
-          </a:p>
-        </p:txBody>
-      </p:sp>
-      <p:sp>
-        <p:nvSpPr>
-          <p:cNvPr id="272" name="Google Shape;272;p47"/>
-          <p:cNvSpPr txBox="1"/>
-          <p:nvPr>
-            <p:ph idx="12" type="sldNum"/>
-          </p:nvPr>
-        </p:nvSpPr>
-        <p:spPr>
-          <a:xfrm>
-            <a:off x="6" y="4730090"/>
-            <a:ext cx="548700" cy="393600"/>
-          </a:xfrm>
-          <a:prstGeom prst="rect">
-            <a:avLst/>
-          </a:prstGeom>
-        </p:spPr>
-        <p:txBody>
-          <a:bodyPr anchorCtr="0" anchor="ctr" bIns="91425" lIns="91425" spcFirstLastPara="1" rIns="91425" wrap="square" tIns="91425">
-            <a:noAutofit/>
-          </a:bodyPr>
-          <a:lstStyle/>
-          <a:p>
-            <a:pPr indent="0" lvl="0" marL="0" rtl="0" algn="r">
-              <a:spcBef>
-                <a:spcPts val="0"/>
-              </a:spcBef>
-              <a:spcAft>
-                <a:spcPts val="0"/>
-              </a:spcAft>
-              <a:buNone/>
-            </a:pPr>
-            <a:fld id="{00000000-1234-1234-1234-123412341234}" type="slidenum">
-              <a:rPr lang="en">
-                <a:solidFill>
-                  <a:schemeClr val="lt1"/>
-                </a:solidFill>
-              </a:rPr>
-              <a:t>‹#›</a:t>
-            </a:fld>
-            <a:endParaRPr>
-              <a:solidFill>
-                <a:schemeClr val="lt1"/>
-              </a:solidFill>
-            </a:endParaRPr>
-          </a:p>
-        </p:txBody>
-      </p:sp>
-      <p:pic>
-        <p:nvPicPr>
-          <p:cNvPr id="273" name="Google Shape;273;p47"/>
-          <p:cNvPicPr preferRelativeResize="0"/>
-          <p:nvPr/>
-        </p:nvPicPr>
-        <p:blipFill>
-          <a:blip r:embed="rId4">
-            <a:alphaModFix/>
-          </a:blip>
-          <a:stretch>
-            <a:fillRect/>
-          </a:stretch>
-        </p:blipFill>
-        <p:spPr>
-          <a:xfrm>
-            <a:off x="5444100" y="1576550"/>
-            <a:ext cx="3059275" cy="2274850"/>
-          </a:xfrm>
-          <a:prstGeom prst="rect">
-            <a:avLst/>
-          </a:prstGeom>
-          <a:noFill/>
-          <a:ln>
-            <a:noFill/>
-          </a:ln>
-        </p:spPr>
-      </p:pic>
-      <p:sp>
-        <p:nvSpPr>
-          <p:cNvPr id="274" name="Google Shape;274;p47"/>
-          <p:cNvSpPr txBox="1"/>
-          <p:nvPr/>
-        </p:nvSpPr>
-        <p:spPr>
-          <a:xfrm>
-            <a:off x="5336013" y="3421150"/>
-            <a:ext cx="1989300" cy="354000"/>
-          </a:xfrm>
-          <a:prstGeom prst="rect">
-            <a:avLst/>
-          </a:prstGeom>
-          <a:noFill/>
-          <a:ln>
-            <a:noFill/>
-          </a:ln>
-        </p:spPr>
-        <p:txBody>
-          <a:bodyPr anchorCtr="0" anchor="t" bIns="91425" lIns="91425" spcFirstLastPara="1" rIns="91425" wrap="square" tIns="91425">
-            <a:spAutoFit/>
-          </a:bodyPr>
-          <a:lstStyle/>
-          <a:p>
-            <a:pPr indent="0" lvl="0" marL="0" rtl="0" algn="ctr">
-              <a:spcBef>
-                <a:spcPts val="0"/>
-              </a:spcBef>
-              <a:spcAft>
-                <a:spcPts val="0"/>
-              </a:spcAft>
-              <a:buNone/>
-            </a:pPr>
-            <a:r>
-              <a:rPr lang="en" sz="1100">
-                <a:latin typeface="Roboto"/>
-                <a:ea typeface="Roboto"/>
-                <a:cs typeface="Roboto"/>
-                <a:sym typeface="Roboto"/>
-              </a:rPr>
-              <a:t>(Greener et al. 2022)</a:t>
-            </a:r>
-            <a:endParaRPr sz="1100">
-              <a:latin typeface="Roboto"/>
-              <a:ea typeface="Roboto"/>
-              <a:cs typeface="Roboto"/>
-              <a:sym typeface="Roboto"/>
-            </a:endParaRPr>
-          </a:p>
-        </p:txBody>
-      </p:sp>
-    </p:spTree>
-  </p:cSld>
-  <p:clrMapOvr>
-    <a:masterClrMapping/>
-  </p:clrMapOvr>
-</p:sld>
-</file>
-
-<file path=ppt/slides/slide12.xml><?xml version="1.0" encoding="utf-8"?>
-<p:sld xmlns:a="http://schemas.openxmlformats.org/drawingml/2006/main" xmlns:r="http://schemas.openxmlformats.org/officeDocument/2006/relationships" xmlns:mc="http://schemas.openxmlformats.org/markup-compatibility/2006" xmlns:mv="urn:schemas-microsoft-com:mac:vml" xmlns:p="http://schemas.openxmlformats.org/presentationml/2006/main" xmlns:c="http://schemas.openxmlformats.org/drawingml/2006/chart" xmlns:dgm="http://schemas.openxmlformats.org/drawingml/2006/diagram" xmlns:o="urn:schemas-microsoft-com:office:office" xmlns:v="urn:schemas-microsoft-com:vml" xmlns:pvml="urn:schemas-microsoft-com:office:powerpoint" xmlns:com="http://schemas.openxmlformats.org/drawingml/2006/compatibility" xmlns:p14="http://schemas.microsoft.com/office/powerpoint/2010/main" xmlns:p15="http://schemas.microsoft.com/office/powerpoint/2012/main" xmlns:ahyp="http://schemas.microsoft.com/office/drawing/2018/hyperlinkcolor">
-  <p:cSld>
-    <p:spTree>
-      <p:nvGrpSpPr>
-        <p:cNvPr id="278" name="Shape 278"/>
-        <p:cNvGrpSpPr/>
-        <p:nvPr/>
-      </p:nvGrpSpPr>
-      <p:grpSpPr>
-        <a:xfrm>
-          <a:off x="0" y="0"/>
-          <a:ext cx="0" cy="0"/>
-          <a:chOff x="0" y="0"/>
-          <a:chExt cx="0" cy="0"/>
-        </a:xfrm>
-      </p:grpSpPr>
-      <p:pic>
-        <p:nvPicPr>
-          <p:cNvPr id="279" name="Google Shape;279;p48"/>
-          <p:cNvPicPr preferRelativeResize="0"/>
-          <p:nvPr/>
-        </p:nvPicPr>
-        <p:blipFill>
-          <a:blip r:embed="rId3">
-            <a:alphaModFix/>
-          </a:blip>
-          <a:stretch>
-            <a:fillRect/>
-          </a:stretch>
-        </p:blipFill>
-        <p:spPr>
-          <a:xfrm>
-            <a:off x="0" y="4710300"/>
-            <a:ext cx="9144000" cy="433200"/>
-          </a:xfrm>
-          <a:prstGeom prst="rect">
-            <a:avLst/>
-          </a:prstGeom>
-          <a:noFill/>
-          <a:ln>
-            <a:noFill/>
-          </a:ln>
-        </p:spPr>
-      </p:pic>
-      <p:sp>
-        <p:nvSpPr>
-          <p:cNvPr id="280" name="Google Shape;280;p48"/>
-          <p:cNvSpPr txBox="1"/>
-          <p:nvPr>
-            <p:ph type="title"/>
-          </p:nvPr>
-        </p:nvSpPr>
-        <p:spPr>
-          <a:xfrm>
-            <a:off x="311700" y="109850"/>
-            <a:ext cx="8520600" cy="607800"/>
-          </a:xfrm>
-          <a:prstGeom prst="rect">
-            <a:avLst/>
-          </a:prstGeom>
-        </p:spPr>
-        <p:txBody>
-          <a:bodyPr anchorCtr="0" anchor="t" bIns="91425" lIns="91425" spcFirstLastPara="1" rIns="91425" wrap="square" tIns="91425">
-            <a:noAutofit/>
-          </a:bodyPr>
-          <a:lstStyle/>
-          <a:p>
-            <a:pPr indent="0" lvl="0" marL="0" rtl="0" algn="l">
-              <a:spcBef>
-                <a:spcPts val="0"/>
-              </a:spcBef>
-              <a:spcAft>
-                <a:spcPts val="0"/>
-              </a:spcAft>
-              <a:buNone/>
-            </a:pPr>
-            <a:r>
-              <a:rPr lang="en">
-                <a:solidFill>
-                  <a:srgbClr val="4A86E8"/>
-                </a:solidFill>
-              </a:rPr>
               <a:t>Recurrent neural network</a:t>
             </a:r>
             <a:r>
@@ -23919,7 +23947,7 @@
       </p:sp>
       <p:sp>
         <p:nvSpPr>
-          <p:cNvPr id="281" name="Google Shape;281;p48"/>
+          <p:cNvPr id="282" name="Google Shape;282;p48"/>
           <p:cNvSpPr txBox="1"/>
           <p:nvPr/>
         </p:nvSpPr>
@@ -23956,7 +23984,15 @@
             </a:pPr>
             <a:r>
               <a:rPr lang="en"/>
-              <a:t>Processes each part of a sequential input using the same learned parameters, giving an output and an updated hidden state for every input. The hidden state is used to carry information about the preceding parts of the sequence. In this case the probability of transcription factor binding is predicted for each base in a DNA sequence. </a:t>
+              <a:t>Given</a:t>
+            </a:r>
+            <a:r>
+              <a:rPr lang="en"/>
+              <a:t> an output and an updated hidden state for every input, RNN p</a:t>
+            </a:r>
+            <a:r>
+              <a:rPr lang="en"/>
+              <a:t>rocesses each part of a sequential input using the same learned parameters, The hidden state is used to carry information about the preceding parts of the sequence. In this case the probability of transcription factor binding is predicted for each base in a DNA sequence. </a:t>
             </a:r>
             <a:endParaRPr/>
           </a:p>
@@ -24076,7 +24112,7 @@
             </a:pPr>
             <a:r>
               <a:rPr lang="en"/>
-              <a:t>Predicting clinical events</a:t>
+              <a:t>Clinical event prediction</a:t>
             </a:r>
             <a:endParaRPr/>
           </a:p>
@@ -24204,7 +24240,7 @@
       </p:sp>
       <p:sp>
         <p:nvSpPr>
-          <p:cNvPr id="282" name="Google Shape;282;p48"/>
+          <p:cNvPr id="283" name="Google Shape;283;p48"/>
           <p:cNvSpPr txBox="1"/>
           <p:nvPr>
             <p:ph idx="12" type="sldNum"/>
@@ -24252,7 +24288,7 @@
       </p:sp>
       <p:sp>
         <p:nvSpPr>
-          <p:cNvPr id="283" name="Google Shape;283;p48"/>
+          <p:cNvPr id="284" name="Google Shape;284;p48"/>
           <p:cNvSpPr txBox="1"/>
           <p:nvPr/>
         </p:nvSpPr>
@@ -24304,7 +24340,7 @@
       </p:sp>
       <p:pic>
         <p:nvPicPr>
-          <p:cNvPr id="284" name="Google Shape;284;p48"/>
+          <p:cNvPr id="285" name="Google Shape;285;p48"/>
           <p:cNvPicPr preferRelativeResize="0"/>
           <p:nvPr/>
         </p:nvPicPr>
@@ -24343,7 +24379,7 @@
   <p:cSld>
     <p:spTree>
       <p:nvGrpSpPr>
-        <p:cNvPr id="288" name="Shape 288"/>
+        <p:cNvPr id="289" name="Shape 289"/>
         <p:cNvGrpSpPr/>
         <p:nvPr/>
       </p:nvGrpSpPr>
@@ -24357,7 +24393,7 @@
       </p:grpSpPr>
       <p:pic>
         <p:nvPicPr>
-          <p:cNvPr id="289" name="Google Shape;289;p49"/>
+          <p:cNvPr id="290" name="Google Shape;290;p49"/>
           <p:cNvPicPr preferRelativeResize="0"/>
           <p:nvPr/>
         </p:nvPicPr>
@@ -24385,7 +24421,7 @@
       </p:pic>
       <p:pic>
         <p:nvPicPr>
-          <p:cNvPr id="290" name="Google Shape;290;p49"/>
+          <p:cNvPr id="291" name="Google Shape;291;p49"/>
           <p:cNvPicPr preferRelativeResize="0"/>
           <p:nvPr/>
         </p:nvPicPr>
@@ -24413,7 +24449,7 @@
       </p:pic>
       <p:sp>
         <p:nvSpPr>
-          <p:cNvPr id="291" name="Google Shape;291;p49"/>
+          <p:cNvPr id="292" name="Google Shape;292;p49"/>
           <p:cNvSpPr txBox="1"/>
           <p:nvPr/>
         </p:nvSpPr>
@@ -24718,7 +24754,7 @@
       </p:sp>
       <p:sp>
         <p:nvSpPr>
-          <p:cNvPr id="292" name="Google Shape;292;p49"/>
+          <p:cNvPr id="293" name="Google Shape;293;p49"/>
           <p:cNvSpPr txBox="1"/>
           <p:nvPr>
             <p:ph type="title"/>
@@ -24766,7 +24802,7 @@
       </p:sp>
       <p:sp>
         <p:nvSpPr>
-          <p:cNvPr id="293" name="Google Shape;293;p49"/>
+          <p:cNvPr id="294" name="Google Shape;294;p49"/>
           <p:cNvSpPr txBox="1"/>
           <p:nvPr>
             <p:ph idx="12" type="sldNum"/>
@@ -24814,7 +24850,7 @@
       </p:sp>
       <p:sp>
         <p:nvSpPr>
-          <p:cNvPr id="294" name="Google Shape;294;p49"/>
+          <p:cNvPr id="295" name="Google Shape;295;p49"/>
           <p:cNvSpPr txBox="1"/>
           <p:nvPr/>
         </p:nvSpPr>
@@ -24877,7 +24913,7 @@
   <p:cSld>
     <p:spTree>
       <p:nvGrpSpPr>
-        <p:cNvPr id="298" name="Shape 298"/>
+        <p:cNvPr id="299" name="Shape 299"/>
         <p:cNvGrpSpPr/>
         <p:nvPr/>
       </p:nvGrpSpPr>
@@ -24891,7 +24927,7 @@
       </p:grpSpPr>
       <p:pic>
         <p:nvPicPr>
-          <p:cNvPr id="299" name="Google Shape;299;p50"/>
+          <p:cNvPr id="300" name="Google Shape;300;p50"/>
           <p:cNvPicPr preferRelativeResize="0"/>
           <p:nvPr/>
         </p:nvPicPr>
@@ -24919,7 +24955,7 @@
       </p:pic>
       <p:sp>
         <p:nvSpPr>
-          <p:cNvPr id="300" name="Google Shape;300;p50"/>
+          <p:cNvPr id="301" name="Google Shape;301;p50"/>
           <p:cNvSpPr txBox="1"/>
           <p:nvPr>
             <p:ph type="title"/>
@@ -24967,7 +25003,7 @@
       </p:sp>
       <p:sp>
         <p:nvSpPr>
-          <p:cNvPr id="301" name="Google Shape;301;p50"/>
+          <p:cNvPr id="302" name="Google Shape;302;p50"/>
           <p:cNvSpPr txBox="1"/>
           <p:nvPr/>
         </p:nvSpPr>
@@ -25276,7 +25312,7 @@
       </p:sp>
       <p:sp>
         <p:nvSpPr>
-          <p:cNvPr id="302" name="Google Shape;302;p50"/>
+          <p:cNvPr id="303" name="Google Shape;303;p50"/>
           <p:cNvSpPr txBox="1"/>
           <p:nvPr>
             <p:ph idx="12" type="sldNum"/>
@@ -25324,7 +25360,7 @@
       </p:sp>
       <p:sp>
         <p:nvSpPr>
-          <p:cNvPr id="303" name="Google Shape;303;p50"/>
+          <p:cNvPr id="304" name="Google Shape;304;p50"/>
           <p:cNvSpPr txBox="1"/>
           <p:nvPr/>
         </p:nvSpPr>
@@ -25376,7 +25412,7 @@
       </p:sp>
       <p:pic>
         <p:nvPicPr>
-          <p:cNvPr id="304" name="Google Shape;304;p50"/>
+          <p:cNvPr id="305" name="Google Shape;305;p50"/>
           <p:cNvPicPr preferRelativeResize="0"/>
           <p:nvPr/>
         </p:nvPicPr>
@@ -25415,7 +25451,7 @@
   <p:cSld>
     <p:spTree>
       <p:nvGrpSpPr>
-        <p:cNvPr id="308" name="Shape 308"/>
+        <p:cNvPr id="309" name="Shape 309"/>
         <p:cNvGrpSpPr/>
         <p:nvPr/>
       </p:nvGrpSpPr>
@@ -25429,7 +25465,7 @@
       </p:grpSpPr>
       <p:pic>
         <p:nvPicPr>
-          <p:cNvPr id="309" name="Google Shape;309;p51"/>
+          <p:cNvPr id="310" name="Google Shape;310;p51"/>
           <p:cNvPicPr preferRelativeResize="0"/>
           <p:nvPr/>
         </p:nvPicPr>
@@ -25457,7 +25493,7 @@
       </p:pic>
       <p:sp>
         <p:nvSpPr>
-          <p:cNvPr id="310" name="Google Shape;310;p51"/>
+          <p:cNvPr id="311" name="Google Shape;311;p51"/>
           <p:cNvSpPr txBox="1"/>
           <p:nvPr>
             <p:ph type="title"/>
@@ -25505,7 +25541,7 @@
       </p:sp>
       <p:sp>
         <p:nvSpPr>
-          <p:cNvPr id="311" name="Google Shape;311;p51"/>
+          <p:cNvPr id="312" name="Google Shape;312;p51"/>
           <p:cNvSpPr txBox="1"/>
           <p:nvPr>
             <p:ph idx="12" type="sldNum"/>
@@ -25553,7 +25589,7 @@
       </p:sp>
       <p:sp>
         <p:nvSpPr>
-          <p:cNvPr id="312" name="Google Shape;312;p51"/>
+          <p:cNvPr id="313" name="Google Shape;313;p51"/>
           <p:cNvSpPr txBox="1"/>
           <p:nvPr/>
         </p:nvSpPr>
@@ -25743,7 +25779,7 @@
       </p:sp>
       <p:pic>
         <p:nvPicPr>
-          <p:cNvPr id="313" name="Google Shape;313;p51"/>
+          <p:cNvPr id="314" name="Google Shape;314;p51"/>
           <p:cNvPicPr preferRelativeResize="0"/>
           <p:nvPr/>
         </p:nvPicPr>
@@ -25781,7 +25817,7 @@
   <p:cSld>
     <p:spTree>
       <p:nvGrpSpPr>
-        <p:cNvPr id="317" name="Shape 317"/>
+        <p:cNvPr id="318" name="Shape 318"/>
         <p:cNvGrpSpPr/>
         <p:nvPr/>
       </p:nvGrpSpPr>
@@ -25795,7 +25831,7 @@
       </p:grpSpPr>
       <p:pic>
         <p:nvPicPr>
-          <p:cNvPr id="318" name="Google Shape;318;p52"/>
+          <p:cNvPr id="319" name="Google Shape;319;p52"/>
           <p:cNvPicPr preferRelativeResize="0"/>
           <p:nvPr/>
         </p:nvPicPr>
@@ -25823,7 +25859,7 @@
       </p:pic>
       <p:sp>
         <p:nvSpPr>
-          <p:cNvPr id="319" name="Google Shape;319;p52"/>
+          <p:cNvPr id="320" name="Google Shape;320;p52"/>
           <p:cNvSpPr txBox="1"/>
           <p:nvPr>
             <p:ph type="title"/>
@@ -25879,7 +25915,7 @@
       </p:sp>
       <p:sp>
         <p:nvSpPr>
-          <p:cNvPr id="320" name="Google Shape;320;p52"/>
+          <p:cNvPr id="321" name="Google Shape;321;p52"/>
           <p:cNvSpPr txBox="1"/>
           <p:nvPr/>
         </p:nvSpPr>
@@ -26163,7 +26199,7 @@
       </p:sp>
       <p:sp>
         <p:nvSpPr>
-          <p:cNvPr id="321" name="Google Shape;321;p52"/>
+          <p:cNvPr id="322" name="Google Shape;322;p52"/>
           <p:cNvSpPr txBox="1"/>
           <p:nvPr>
             <p:ph idx="12" type="sldNum"/>
@@ -26211,7 +26247,7 @@
       </p:sp>
       <p:pic>
         <p:nvPicPr>
-          <p:cNvPr id="322" name="Google Shape;322;p52"/>
+          <p:cNvPr id="323" name="Google Shape;323;p52"/>
           <p:cNvPicPr preferRelativeResize="0"/>
           <p:nvPr/>
         </p:nvPicPr>
@@ -26239,7 +26275,7 @@
       </p:pic>
       <p:sp>
         <p:nvSpPr>
-          <p:cNvPr id="323" name="Google Shape;323;p52"/>
+          <p:cNvPr id="324" name="Google Shape;324;p52"/>
           <p:cNvSpPr txBox="1"/>
           <p:nvPr/>
         </p:nvSpPr>
@@ -26302,7 +26338,7 @@
   <p:cSld>
     <p:spTree>
       <p:nvGrpSpPr>
-        <p:cNvPr id="327" name="Shape 327"/>
+        <p:cNvPr id="328" name="Shape 328"/>
         <p:cNvGrpSpPr/>
         <p:nvPr/>
       </p:nvGrpSpPr>
@@ -26316,7 +26352,7 @@
       </p:grpSpPr>
       <p:pic>
         <p:nvPicPr>
-          <p:cNvPr id="328" name="Google Shape;328;p53"/>
+          <p:cNvPr id="329" name="Google Shape;329;p53"/>
           <p:cNvPicPr preferRelativeResize="0"/>
           <p:nvPr/>
         </p:nvPicPr>
@@ -26344,7 +26380,7 @@
       </p:pic>
       <p:sp>
         <p:nvSpPr>
-          <p:cNvPr id="329" name="Google Shape;329;p53"/>
+          <p:cNvPr id="330" name="Google Shape;330;p53"/>
           <p:cNvSpPr txBox="1"/>
           <p:nvPr>
             <p:ph type="title"/>
@@ -26400,14 +26436,14 @@
       </p:sp>
       <p:sp>
         <p:nvSpPr>
-          <p:cNvPr id="330" name="Google Shape;330;p53"/>
+          <p:cNvPr id="331" name="Google Shape;331;p53"/>
           <p:cNvSpPr txBox="1"/>
           <p:nvPr/>
         </p:nvSpPr>
         <p:spPr>
           <a:xfrm>
             <a:off x="4275100" y="717650"/>
-            <a:ext cx="4623900" cy="3869700"/>
+            <a:ext cx="4623900" cy="3374100"/>
           </a:xfrm>
           <a:prstGeom prst="rect">
             <a:avLst/>
@@ -26600,26 +26636,6 @@
               <a:rPr b="1" lang="en"/>
               <a:t>Challenges</a:t>
             </a:r>
-            <a:endParaRPr b="1"/>
-          </a:p>
-          <a:p>
-            <a:pPr indent="-317500" lvl="1" marL="914400" rtl="0" algn="l">
-              <a:lnSpc>
-                <a:spcPct val="115000"/>
-              </a:lnSpc>
-              <a:spcBef>
-                <a:spcPts val="0"/>
-              </a:spcBef>
-              <a:spcAft>
-                <a:spcPts val="0"/>
-              </a:spcAft>
-              <a:buSzPts val="1400"/>
-              <a:buChar char="○"/>
-            </a:pPr>
-            <a:r>
-              <a:rPr lang="en"/>
-              <a:t>Metagenome data stored in many places and therefore hard to access</a:t>
-            </a:r>
             <a:endParaRPr/>
           </a:p>
           <a:p>
@@ -26664,7 +26680,7 @@
       </p:sp>
       <p:sp>
         <p:nvSpPr>
-          <p:cNvPr id="331" name="Google Shape;331;p53"/>
+          <p:cNvPr id="332" name="Google Shape;332;p53"/>
           <p:cNvSpPr txBox="1"/>
           <p:nvPr>
             <p:ph idx="12" type="sldNum"/>
@@ -26712,7 +26728,7 @@
       </p:sp>
       <p:pic>
         <p:nvPicPr>
-          <p:cNvPr id="332" name="Google Shape;332;p53"/>
+          <p:cNvPr id="333" name="Google Shape;333;p53"/>
           <p:cNvPicPr preferRelativeResize="0"/>
           <p:nvPr/>
         </p:nvPicPr>
@@ -26740,7 +26756,7 @@
       </p:pic>
       <p:sp>
         <p:nvSpPr>
-          <p:cNvPr id="333" name="Google Shape;333;p53"/>
+          <p:cNvPr id="334" name="Google Shape;334;p53"/>
           <p:cNvSpPr txBox="1"/>
           <p:nvPr/>
         </p:nvSpPr>
@@ -26803,7 +26819,7 @@
   <p:cSld>
     <p:spTree>
       <p:nvGrpSpPr>
-        <p:cNvPr id="337" name="Shape 337"/>
+        <p:cNvPr id="338" name="Shape 338"/>
         <p:cNvGrpSpPr/>
         <p:nvPr/>
       </p:nvGrpSpPr>
@@ -26817,7 +26833,7 @@
       </p:grpSpPr>
       <p:pic>
         <p:nvPicPr>
-          <p:cNvPr id="338" name="Google Shape;338;p54"/>
+          <p:cNvPr id="339" name="Google Shape;339;p54"/>
           <p:cNvPicPr preferRelativeResize="0"/>
           <p:nvPr/>
         </p:nvPicPr>
@@ -26845,7 +26861,7 @@
       </p:pic>
       <p:sp>
         <p:nvSpPr>
-          <p:cNvPr id="339" name="Google Shape;339;p54"/>
+          <p:cNvPr id="340" name="Google Shape;340;p54"/>
           <p:cNvSpPr txBox="1"/>
           <p:nvPr>
             <p:ph type="title"/>
@@ -26893,7 +26909,7 @@
       </p:sp>
       <p:sp>
         <p:nvSpPr>
-          <p:cNvPr id="340" name="Google Shape;340;p54"/>
+          <p:cNvPr id="341" name="Google Shape;341;p54"/>
           <p:cNvSpPr txBox="1"/>
           <p:nvPr/>
         </p:nvSpPr>
@@ -27177,7 +27193,7 @@
       </p:sp>
       <p:sp>
         <p:nvSpPr>
-          <p:cNvPr id="341" name="Google Shape;341;p54"/>
+          <p:cNvPr id="342" name="Google Shape;342;p54"/>
           <p:cNvSpPr txBox="1"/>
           <p:nvPr>
             <p:ph idx="12" type="sldNum"/>
@@ -27225,7 +27241,7 @@
       </p:sp>
       <p:pic>
         <p:nvPicPr>
-          <p:cNvPr id="342" name="Google Shape;342;p54"/>
+          <p:cNvPr id="343" name="Google Shape;343;p54"/>
           <p:cNvPicPr preferRelativeResize="0"/>
           <p:nvPr/>
         </p:nvPicPr>
@@ -27253,7 +27269,7 @@
       </p:pic>
       <p:sp>
         <p:nvSpPr>
-          <p:cNvPr id="343" name="Google Shape;343;p54"/>
+          <p:cNvPr id="344" name="Google Shape;344;p54"/>
           <p:cNvSpPr txBox="1"/>
           <p:nvPr/>
         </p:nvSpPr>
@@ -27316,7 +27332,7 @@
   <p:cSld>
     <p:spTree>
       <p:nvGrpSpPr>
-        <p:cNvPr id="347" name="Shape 347"/>
+        <p:cNvPr id="348" name="Shape 348"/>
         <p:cNvGrpSpPr/>
         <p:nvPr/>
       </p:nvGrpSpPr>
@@ -27330,7 +27346,7 @@
       </p:grpSpPr>
       <p:pic>
         <p:nvPicPr>
-          <p:cNvPr id="348" name="Google Shape;348;p55"/>
+          <p:cNvPr id="349" name="Google Shape;349;p55"/>
           <p:cNvPicPr preferRelativeResize="0"/>
           <p:nvPr/>
         </p:nvPicPr>
@@ -27358,7 +27374,7 @@
       </p:pic>
       <p:sp>
         <p:nvSpPr>
-          <p:cNvPr id="349" name="Google Shape;349;p55"/>
+          <p:cNvPr id="350" name="Google Shape;350;p55"/>
           <p:cNvSpPr txBox="1"/>
           <p:nvPr>
             <p:ph type="title"/>
@@ -27406,7 +27422,7 @@
       </p:sp>
       <p:sp>
         <p:nvSpPr>
-          <p:cNvPr id="350" name="Google Shape;350;p55"/>
+          <p:cNvPr id="351" name="Google Shape;351;p55"/>
           <p:cNvSpPr txBox="1"/>
           <p:nvPr/>
         </p:nvSpPr>
@@ -27670,7 +27686,7 @@
       </p:sp>
       <p:sp>
         <p:nvSpPr>
-          <p:cNvPr id="351" name="Google Shape;351;p55"/>
+          <p:cNvPr id="352" name="Google Shape;352;p55"/>
           <p:cNvSpPr txBox="1"/>
           <p:nvPr>
             <p:ph idx="12" type="sldNum"/>
@@ -27718,7 +27734,7 @@
       </p:sp>
       <p:pic>
         <p:nvPicPr>
-          <p:cNvPr id="352" name="Google Shape;352;p55"/>
+          <p:cNvPr id="353" name="Google Shape;353;p55"/>
           <p:cNvPicPr preferRelativeResize="0"/>
           <p:nvPr/>
         </p:nvPicPr>
@@ -27746,7 +27762,7 @@
       </p:pic>
       <p:sp>
         <p:nvSpPr>
-          <p:cNvPr id="353" name="Google Shape;353;p55"/>
+          <p:cNvPr id="354" name="Google Shape;354;p55"/>
           <p:cNvSpPr txBox="1"/>
           <p:nvPr/>
         </p:nvSpPr>
@@ -27827,7 +27843,7 @@
   <p:cSld>
     <p:spTree>
       <p:nvGrpSpPr>
-        <p:cNvPr id="182" name="Shape 182"/>
+        <p:cNvPr id="183" name="Shape 183"/>
         <p:cNvGrpSpPr/>
         <p:nvPr/>
       </p:nvGrpSpPr>
@@ -27841,7 +27857,7 @@
       </p:grpSpPr>
       <p:sp>
         <p:nvSpPr>
-          <p:cNvPr id="183" name="Google Shape;183;p38"/>
+          <p:cNvPr id="184" name="Google Shape;184;p38"/>
           <p:cNvSpPr txBox="1"/>
           <p:nvPr>
             <p:ph idx="4294967295" type="ctrTitle"/>
@@ -27913,7 +27929,7 @@
       </p:sp>
       <p:sp>
         <p:nvSpPr>
-          <p:cNvPr id="184" name="Google Shape;184;p38"/>
+          <p:cNvPr id="185" name="Google Shape;185;p38"/>
           <p:cNvSpPr txBox="1"/>
           <p:nvPr>
             <p:ph idx="12" type="sldNum"/>
@@ -27953,7 +27969,7 @@
       </p:sp>
       <p:pic>
         <p:nvPicPr>
-          <p:cNvPr id="185" name="Google Shape;185;p38"/>
+          <p:cNvPr id="186" name="Google Shape;186;p38"/>
           <p:cNvPicPr preferRelativeResize="0"/>
           <p:nvPr/>
         </p:nvPicPr>
@@ -27992,7 +28008,7 @@
   <p:cSld>
     <p:spTree>
       <p:nvGrpSpPr>
-        <p:cNvPr id="357" name="Shape 357"/>
+        <p:cNvPr id="358" name="Shape 358"/>
         <p:cNvGrpSpPr/>
         <p:nvPr/>
       </p:nvGrpSpPr>
@@ -28006,7 +28022,7 @@
       </p:grpSpPr>
       <p:pic>
         <p:nvPicPr>
-          <p:cNvPr id="358" name="Google Shape;358;p56"/>
+          <p:cNvPr id="359" name="Google Shape;359;p56"/>
           <p:cNvPicPr preferRelativeResize="0"/>
           <p:nvPr/>
         </p:nvPicPr>
@@ -28034,7 +28050,7 @@
       </p:pic>
       <p:sp>
         <p:nvSpPr>
-          <p:cNvPr id="359" name="Google Shape;359;p56"/>
+          <p:cNvPr id="360" name="Google Shape;360;p56"/>
           <p:cNvSpPr txBox="1"/>
           <p:nvPr>
             <p:ph type="title"/>
@@ -28082,7 +28098,7 @@
       </p:sp>
       <p:sp>
         <p:nvSpPr>
-          <p:cNvPr id="360" name="Google Shape;360;p56"/>
+          <p:cNvPr id="361" name="Google Shape;361;p56"/>
           <p:cNvSpPr txBox="1"/>
           <p:nvPr/>
         </p:nvSpPr>
@@ -28306,7 +28322,7 @@
       </p:sp>
       <p:sp>
         <p:nvSpPr>
-          <p:cNvPr id="361" name="Google Shape;361;p56"/>
+          <p:cNvPr id="362" name="Google Shape;362;p56"/>
           <p:cNvSpPr txBox="1"/>
           <p:nvPr>
             <p:ph idx="12" type="sldNum"/>
@@ -28354,7 +28370,7 @@
       </p:sp>
       <p:sp>
         <p:nvSpPr>
-          <p:cNvPr id="362" name="Google Shape;362;p56"/>
+          <p:cNvPr id="363" name="Google Shape;363;p56"/>
           <p:cNvSpPr txBox="1"/>
           <p:nvPr/>
         </p:nvSpPr>
@@ -28406,7 +28422,7 @@
       </p:sp>
       <p:pic>
         <p:nvPicPr>
-          <p:cNvPr id="363" name="Google Shape;363;p56"/>
+          <p:cNvPr id="364" name="Google Shape;364;p56"/>
           <p:cNvPicPr preferRelativeResize="0"/>
           <p:nvPr/>
         </p:nvPicPr>
@@ -28445,7 +28461,7 @@
   <p:cSld>
     <p:spTree>
       <p:nvGrpSpPr>
-        <p:cNvPr id="367" name="Shape 367"/>
+        <p:cNvPr id="368" name="Shape 368"/>
         <p:cNvGrpSpPr/>
         <p:nvPr/>
       </p:nvGrpSpPr>
@@ -28459,7 +28475,7 @@
       </p:grpSpPr>
       <p:pic>
         <p:nvPicPr>
-          <p:cNvPr id="368" name="Google Shape;368;p57"/>
+          <p:cNvPr id="369" name="Google Shape;369;p57"/>
           <p:cNvPicPr preferRelativeResize="0"/>
           <p:nvPr/>
         </p:nvPicPr>
@@ -28487,7 +28503,7 @@
       </p:pic>
       <p:sp>
         <p:nvSpPr>
-          <p:cNvPr id="369" name="Google Shape;369;p57"/>
+          <p:cNvPr id="370" name="Google Shape;370;p57"/>
           <p:cNvSpPr txBox="1"/>
           <p:nvPr>
             <p:ph type="title"/>
@@ -28535,7 +28551,7 @@
       </p:sp>
       <p:sp>
         <p:nvSpPr>
-          <p:cNvPr id="370" name="Google Shape;370;p57"/>
+          <p:cNvPr id="371" name="Google Shape;371;p57"/>
           <p:cNvSpPr txBox="1"/>
           <p:nvPr/>
         </p:nvSpPr>
@@ -28799,7 +28815,7 @@
       </p:sp>
       <p:sp>
         <p:nvSpPr>
-          <p:cNvPr id="371" name="Google Shape;371;p57"/>
+          <p:cNvPr id="372" name="Google Shape;372;p57"/>
           <p:cNvSpPr txBox="1"/>
           <p:nvPr>
             <p:ph idx="12" type="sldNum"/>
@@ -28847,7 +28863,7 @@
       </p:sp>
       <p:sp>
         <p:nvSpPr>
-          <p:cNvPr id="372" name="Google Shape;372;p57"/>
+          <p:cNvPr id="373" name="Google Shape;373;p57"/>
           <p:cNvSpPr txBox="1"/>
           <p:nvPr/>
         </p:nvSpPr>
@@ -28917,7 +28933,7 @@
       </p:sp>
       <p:pic>
         <p:nvPicPr>
-          <p:cNvPr id="373" name="Google Shape;373;p57"/>
+          <p:cNvPr id="374" name="Google Shape;374;p57"/>
           <p:cNvPicPr preferRelativeResize="0"/>
           <p:nvPr/>
         </p:nvPicPr>
@@ -28956,7 +28972,7 @@
   <p:cSld>
     <p:spTree>
       <p:nvGrpSpPr>
-        <p:cNvPr id="377" name="Shape 377"/>
+        <p:cNvPr id="378" name="Shape 378"/>
         <p:cNvGrpSpPr/>
         <p:nvPr/>
       </p:nvGrpSpPr>
@@ -28970,7 +28986,7 @@
       </p:grpSpPr>
       <p:pic>
         <p:nvPicPr>
-          <p:cNvPr id="378" name="Google Shape;378;p58"/>
+          <p:cNvPr id="379" name="Google Shape;379;p58"/>
           <p:cNvPicPr preferRelativeResize="0"/>
           <p:nvPr/>
         </p:nvPicPr>
@@ -28998,7 +29014,7 @@
       </p:pic>
       <p:sp>
         <p:nvSpPr>
-          <p:cNvPr id="379" name="Google Shape;379;p58"/>
+          <p:cNvPr id="380" name="Google Shape;380;p58"/>
           <p:cNvSpPr txBox="1"/>
           <p:nvPr>
             <p:ph type="title"/>
@@ -29046,7 +29062,7 @@
       </p:sp>
       <p:sp>
         <p:nvSpPr>
-          <p:cNvPr id="380" name="Google Shape;380;p58"/>
+          <p:cNvPr id="381" name="Google Shape;381;p58"/>
           <p:cNvSpPr txBox="1"/>
           <p:nvPr/>
         </p:nvSpPr>
@@ -29164,7 +29180,7 @@
             </a:pPr>
             <a:r>
               <a:rPr lang="en"/>
-              <a:t>Novel drug generation</a:t>
+              <a:t>Novel drug discovery</a:t>
             </a:r>
             <a:endParaRPr/>
           </a:p>
@@ -29312,7 +29328,7 @@
       </p:sp>
       <p:sp>
         <p:nvSpPr>
-          <p:cNvPr id="381" name="Google Shape;381;p58"/>
+          <p:cNvPr id="382" name="Google Shape;382;p58"/>
           <p:cNvSpPr txBox="1"/>
           <p:nvPr>
             <p:ph idx="12" type="sldNum"/>
@@ -29360,7 +29376,7 @@
       </p:sp>
       <p:sp>
         <p:nvSpPr>
-          <p:cNvPr id="382" name="Google Shape;382;p58"/>
+          <p:cNvPr id="383" name="Google Shape;383;p58"/>
           <p:cNvSpPr txBox="1"/>
           <p:nvPr/>
         </p:nvSpPr>
@@ -29412,7 +29428,7 @@
       </p:sp>
       <p:pic>
         <p:nvPicPr>
-          <p:cNvPr id="383" name="Google Shape;383;p58"/>
+          <p:cNvPr id="384" name="Google Shape;384;p58"/>
           <p:cNvPicPr preferRelativeResize="0"/>
           <p:nvPr/>
         </p:nvPicPr>
@@ -29451,7 +29467,7 @@
   <p:cSld>
     <p:spTree>
       <p:nvGrpSpPr>
-        <p:cNvPr id="387" name="Shape 387"/>
+        <p:cNvPr id="388" name="Shape 388"/>
         <p:cNvGrpSpPr/>
         <p:nvPr/>
       </p:nvGrpSpPr>
@@ -29465,7 +29481,7 @@
       </p:grpSpPr>
       <p:pic>
         <p:nvPicPr>
-          <p:cNvPr id="388" name="Google Shape;388;p59"/>
+          <p:cNvPr id="389" name="Google Shape;389;p59"/>
           <p:cNvPicPr preferRelativeResize="0"/>
           <p:nvPr/>
         </p:nvPicPr>
@@ -29493,7 +29509,7 @@
       </p:pic>
       <p:sp>
         <p:nvSpPr>
-          <p:cNvPr id="389" name="Google Shape;389;p59"/>
+          <p:cNvPr id="390" name="Google Shape;390;p59"/>
           <p:cNvSpPr txBox="1"/>
           <p:nvPr>
             <p:ph type="title"/>
@@ -29541,7 +29557,7 @@
       </p:sp>
       <p:sp>
         <p:nvSpPr>
-          <p:cNvPr id="390" name="Google Shape;390;p59"/>
+          <p:cNvPr id="391" name="Google Shape;391;p59"/>
           <p:cNvSpPr txBox="1"/>
           <p:nvPr/>
         </p:nvSpPr>
@@ -29767,7 +29783,7 @@
       </p:sp>
       <p:sp>
         <p:nvSpPr>
-          <p:cNvPr id="391" name="Google Shape;391;p59"/>
+          <p:cNvPr id="392" name="Google Shape;392;p59"/>
           <p:cNvSpPr txBox="1"/>
           <p:nvPr>
             <p:ph idx="12" type="sldNum"/>
@@ -29815,7 +29831,7 @@
       </p:sp>
       <p:sp>
         <p:nvSpPr>
-          <p:cNvPr id="392" name="Google Shape;392;p59"/>
+          <p:cNvPr id="393" name="Google Shape;393;p59"/>
           <p:cNvSpPr txBox="1"/>
           <p:nvPr/>
         </p:nvSpPr>
@@ -29867,7 +29883,7 @@
       </p:sp>
       <p:pic>
         <p:nvPicPr>
-          <p:cNvPr id="393" name="Google Shape;393;p59"/>
+          <p:cNvPr id="394" name="Google Shape;394;p59"/>
           <p:cNvPicPr preferRelativeResize="0"/>
           <p:nvPr/>
         </p:nvPicPr>
@@ -29906,7 +29922,7 @@
   <p:cSld>
     <p:spTree>
       <p:nvGrpSpPr>
-        <p:cNvPr id="397" name="Shape 397"/>
+        <p:cNvPr id="398" name="Shape 398"/>
         <p:cNvGrpSpPr/>
         <p:nvPr/>
       </p:nvGrpSpPr>
@@ -29920,7 +29936,7 @@
       </p:grpSpPr>
       <p:pic>
         <p:nvPicPr>
-          <p:cNvPr id="398" name="Google Shape;398;p60"/>
+          <p:cNvPr id="399" name="Google Shape;399;p60"/>
           <p:cNvPicPr preferRelativeResize="0"/>
           <p:nvPr/>
         </p:nvPicPr>
@@ -29948,7 +29964,7 @@
       </p:pic>
       <p:sp>
         <p:nvSpPr>
-          <p:cNvPr id="399" name="Google Shape;399;p60"/>
+          <p:cNvPr id="400" name="Google Shape;400;p60"/>
           <p:cNvSpPr txBox="1"/>
           <p:nvPr>
             <p:ph type="title"/>
@@ -29996,7 +30012,7 @@
       </p:sp>
       <p:sp>
         <p:nvSpPr>
-          <p:cNvPr id="400" name="Google Shape;400;p60"/>
+          <p:cNvPr id="401" name="Google Shape;401;p60"/>
           <p:cNvSpPr txBox="1"/>
           <p:nvPr>
             <p:ph idx="12" type="sldNum"/>
@@ -30044,7 +30060,7 @@
       </p:sp>
       <p:pic>
         <p:nvPicPr>
-          <p:cNvPr id="401" name="Google Shape;401;p60"/>
+          <p:cNvPr id="402" name="Google Shape;402;p60"/>
           <p:cNvPicPr preferRelativeResize="0"/>
           <p:nvPr/>
         </p:nvPicPr>
@@ -30072,7 +30088,7 @@
       </p:pic>
       <p:sp>
         <p:nvSpPr>
-          <p:cNvPr id="402" name="Google Shape;402;p60"/>
+          <p:cNvPr id="403" name="Google Shape;403;p60"/>
           <p:cNvSpPr txBox="1"/>
           <p:nvPr/>
         </p:nvSpPr>
@@ -30135,7 +30151,7 @@
   <p:cSld>
     <p:spTree>
       <p:nvGrpSpPr>
-        <p:cNvPr id="406" name="Shape 406"/>
+        <p:cNvPr id="407" name="Shape 407"/>
         <p:cNvGrpSpPr/>
         <p:nvPr/>
       </p:nvGrpSpPr>
@@ -30149,7 +30165,7 @@
       </p:grpSpPr>
       <p:pic>
         <p:nvPicPr>
-          <p:cNvPr id="407" name="Google Shape;407;p61"/>
+          <p:cNvPr id="408" name="Google Shape;408;p61"/>
           <p:cNvPicPr preferRelativeResize="0"/>
           <p:nvPr/>
         </p:nvPicPr>
@@ -30177,7 +30193,7 @@
       </p:pic>
       <p:sp>
         <p:nvSpPr>
-          <p:cNvPr id="408" name="Google Shape;408;p61"/>
+          <p:cNvPr id="409" name="Google Shape;409;p61"/>
           <p:cNvSpPr txBox="1"/>
           <p:nvPr>
             <p:ph type="title"/>
@@ -30225,7 +30241,7 @@
       </p:sp>
       <p:sp>
         <p:nvSpPr>
-          <p:cNvPr id="409" name="Google Shape;409;p61"/>
+          <p:cNvPr id="410" name="Google Shape;410;p61"/>
           <p:cNvSpPr txBox="1"/>
           <p:nvPr>
             <p:ph idx="12" type="sldNum"/>
@@ -30273,7 +30289,7 @@
       </p:sp>
       <p:sp>
         <p:nvSpPr>
-          <p:cNvPr id="410" name="Google Shape;410;p61"/>
+          <p:cNvPr id="411" name="Google Shape;411;p61"/>
           <p:cNvSpPr txBox="1"/>
           <p:nvPr/>
         </p:nvSpPr>
@@ -30463,7 +30479,7 @@
       </p:sp>
       <p:pic>
         <p:nvPicPr>
-          <p:cNvPr id="411" name="Google Shape;411;p61"/>
+          <p:cNvPr id="412" name="Google Shape;412;p61"/>
           <p:cNvPicPr preferRelativeResize="0"/>
           <p:nvPr/>
         </p:nvPicPr>
@@ -30501,7 +30517,7 @@
   <p:cSld>
     <p:spTree>
       <p:nvGrpSpPr>
-        <p:cNvPr id="415" name="Shape 415"/>
+        <p:cNvPr id="416" name="Shape 416"/>
         <p:cNvGrpSpPr/>
         <p:nvPr/>
       </p:nvGrpSpPr>
@@ -30515,7 +30531,7 @@
       </p:grpSpPr>
       <p:pic>
         <p:nvPicPr>
-          <p:cNvPr id="416" name="Google Shape;416;p62"/>
+          <p:cNvPr id="417" name="Google Shape;417;p62"/>
           <p:cNvPicPr preferRelativeResize="0"/>
           <p:nvPr/>
         </p:nvPicPr>
@@ -30543,7 +30559,7 @@
       </p:pic>
       <p:pic>
         <p:nvPicPr>
-          <p:cNvPr id="417" name="Google Shape;417;p62"/>
+          <p:cNvPr id="418" name="Google Shape;418;p62"/>
           <p:cNvPicPr preferRelativeResize="0"/>
           <p:nvPr/>
         </p:nvPicPr>
@@ -30571,7 +30587,7 @@
       </p:pic>
       <p:sp>
         <p:nvSpPr>
-          <p:cNvPr id="418" name="Google Shape;418;p62"/>
+          <p:cNvPr id="419" name="Google Shape;419;p62"/>
           <p:cNvSpPr txBox="1"/>
           <p:nvPr/>
         </p:nvSpPr>
@@ -30785,7 +30801,7 @@
       </p:sp>
       <p:sp>
         <p:nvSpPr>
-          <p:cNvPr id="419" name="Google Shape;419;p62"/>
+          <p:cNvPr id="420" name="Google Shape;420;p62"/>
           <p:cNvSpPr txBox="1"/>
           <p:nvPr>
             <p:ph type="title"/>
@@ -30833,7 +30849,7 @@
       </p:sp>
       <p:sp>
         <p:nvSpPr>
-          <p:cNvPr id="420" name="Google Shape;420;p62"/>
+          <p:cNvPr id="421" name="Google Shape;421;p62"/>
           <p:cNvSpPr txBox="1"/>
           <p:nvPr>
             <p:ph idx="12" type="sldNum"/>
@@ -30881,7 +30897,7 @@
       </p:sp>
       <p:sp>
         <p:nvSpPr>
-          <p:cNvPr id="421" name="Google Shape;421;p62"/>
+          <p:cNvPr id="422" name="Google Shape;422;p62"/>
           <p:cNvSpPr txBox="1"/>
           <p:nvPr/>
         </p:nvSpPr>
@@ -30962,7 +30978,7 @@
   <p:cSld>
     <p:spTree>
       <p:nvGrpSpPr>
-        <p:cNvPr id="425" name="Shape 425"/>
+        <p:cNvPr id="426" name="Shape 426"/>
         <p:cNvGrpSpPr/>
         <p:nvPr/>
       </p:nvGrpSpPr>
@@ -30976,7 +30992,7 @@
       </p:grpSpPr>
       <p:pic>
         <p:nvPicPr>
-          <p:cNvPr id="426" name="Google Shape;426;p63"/>
+          <p:cNvPr id="427" name="Google Shape;427;p63"/>
           <p:cNvPicPr preferRelativeResize="0"/>
           <p:nvPr/>
         </p:nvPicPr>
@@ -31004,7 +31020,7 @@
       </p:pic>
       <p:sp>
         <p:nvSpPr>
-          <p:cNvPr id="427" name="Google Shape;427;p63"/>
+          <p:cNvPr id="428" name="Google Shape;428;p63"/>
           <p:cNvSpPr txBox="1"/>
           <p:nvPr>
             <p:ph type="title"/>
@@ -31060,7 +31076,7 @@
       </p:sp>
       <p:sp>
         <p:nvSpPr>
-          <p:cNvPr id="428" name="Google Shape;428;p63"/>
+          <p:cNvPr id="429" name="Google Shape;429;p63"/>
           <p:cNvSpPr txBox="1"/>
           <p:nvPr>
             <p:ph idx="12" type="sldNum"/>
@@ -31108,7 +31124,7 @@
       </p:sp>
       <p:sp>
         <p:nvSpPr>
-          <p:cNvPr id="429" name="Google Shape;429;p63"/>
+          <p:cNvPr id="430" name="Google Shape;430;p63"/>
           <p:cNvSpPr txBox="1"/>
           <p:nvPr/>
         </p:nvSpPr>
@@ -31326,7 +31342,7 @@
       </p:sp>
       <p:sp>
         <p:nvSpPr>
-          <p:cNvPr id="430" name="Google Shape;430;p63"/>
+          <p:cNvPr id="431" name="Google Shape;431;p63"/>
           <p:cNvSpPr txBox="1"/>
           <p:nvPr/>
         </p:nvSpPr>
@@ -31440,7 +31456,7 @@
       </p:sp>
       <p:pic>
         <p:nvPicPr>
-          <p:cNvPr id="431" name="Google Shape;431;p63"/>
+          <p:cNvPr id="432" name="Google Shape;432;p63"/>
           <p:cNvPicPr preferRelativeResize="0"/>
           <p:nvPr/>
         </p:nvPicPr>
@@ -31479,7 +31495,7 @@
   <p:cSld>
     <p:spTree>
       <p:nvGrpSpPr>
-        <p:cNvPr id="435" name="Shape 435"/>
+        <p:cNvPr id="436" name="Shape 436"/>
         <p:cNvGrpSpPr/>
         <p:nvPr/>
       </p:nvGrpSpPr>
@@ -31493,7 +31509,7 @@
       </p:grpSpPr>
       <p:pic>
         <p:nvPicPr>
-          <p:cNvPr id="436" name="Google Shape;436;p64"/>
+          <p:cNvPr id="437" name="Google Shape;437;p64"/>
           <p:cNvPicPr preferRelativeResize="0"/>
           <p:nvPr/>
         </p:nvPicPr>
@@ -31521,7 +31537,7 @@
       </p:pic>
       <p:pic>
         <p:nvPicPr>
-          <p:cNvPr id="437" name="Google Shape;437;p64"/>
+          <p:cNvPr id="438" name="Google Shape;438;p64"/>
           <p:cNvPicPr preferRelativeResize="0"/>
           <p:nvPr/>
         </p:nvPicPr>
@@ -31549,7 +31565,7 @@
       </p:pic>
       <p:sp>
         <p:nvSpPr>
-          <p:cNvPr id="438" name="Google Shape;438;p64"/>
+          <p:cNvPr id="439" name="Google Shape;439;p64"/>
           <p:cNvSpPr txBox="1"/>
           <p:nvPr>
             <p:ph type="title"/>
@@ -31605,7 +31621,7 @@
       </p:sp>
       <p:sp>
         <p:nvSpPr>
-          <p:cNvPr id="439" name="Google Shape;439;p64"/>
+          <p:cNvPr id="440" name="Google Shape;440;p64"/>
           <p:cNvSpPr txBox="1"/>
           <p:nvPr>
             <p:ph idx="12" type="sldNum"/>
@@ -31653,7 +31669,7 @@
       </p:sp>
       <p:sp>
         <p:nvSpPr>
-          <p:cNvPr id="440" name="Google Shape;440;p64"/>
+          <p:cNvPr id="441" name="Google Shape;441;p64"/>
           <p:cNvSpPr txBox="1"/>
           <p:nvPr/>
         </p:nvSpPr>
@@ -31705,7 +31721,7 @@
       </p:sp>
       <p:sp>
         <p:nvSpPr>
-          <p:cNvPr id="441" name="Google Shape;441;p64"/>
+          <p:cNvPr id="442" name="Google Shape;442;p64"/>
           <p:cNvSpPr txBox="1"/>
           <p:nvPr/>
         </p:nvSpPr>
@@ -31923,7 +31939,7 @@
   <p:cSld>
     <p:spTree>
       <p:nvGrpSpPr>
-        <p:cNvPr id="445" name="Shape 445"/>
+        <p:cNvPr id="446" name="Shape 446"/>
         <p:cNvGrpSpPr/>
         <p:nvPr/>
       </p:nvGrpSpPr>
@@ -31937,7 +31953,7 @@
       </p:grpSpPr>
       <p:pic>
         <p:nvPicPr>
-          <p:cNvPr id="446" name="Google Shape;446;p65"/>
+          <p:cNvPr id="447" name="Google Shape;447;p65"/>
           <p:cNvPicPr preferRelativeResize="0"/>
           <p:nvPr/>
         </p:nvPicPr>
@@ -31965,7 +31981,7 @@
       </p:pic>
       <p:sp>
         <p:nvSpPr>
-          <p:cNvPr id="447" name="Google Shape;447;p65"/>
+          <p:cNvPr id="448" name="Google Shape;448;p65"/>
           <p:cNvSpPr txBox="1"/>
           <p:nvPr>
             <p:ph type="title"/>
@@ -32013,7 +32029,7 @@
       </p:sp>
       <p:sp>
         <p:nvSpPr>
-          <p:cNvPr id="448" name="Google Shape;448;p65"/>
+          <p:cNvPr id="449" name="Google Shape;449;p65"/>
           <p:cNvSpPr txBox="1"/>
           <p:nvPr>
             <p:ph idx="12" type="sldNum"/>
@@ -32061,7 +32077,7 @@
       </p:sp>
       <p:sp>
         <p:nvSpPr>
-          <p:cNvPr id="449" name="Google Shape;449;p65"/>
+          <p:cNvPr id="450" name="Google Shape;450;p65"/>
           <p:cNvSpPr txBox="1"/>
           <p:nvPr/>
         </p:nvSpPr>
@@ -32251,7 +32267,7 @@
       </p:sp>
       <p:pic>
         <p:nvPicPr>
-          <p:cNvPr id="450" name="Google Shape;450;p65"/>
+          <p:cNvPr id="451" name="Google Shape;451;p65"/>
           <p:cNvPicPr preferRelativeResize="0"/>
           <p:nvPr/>
         </p:nvPicPr>
@@ -32289,7 +32305,7 @@
   <p:cSld>
     <p:spTree>
       <p:nvGrpSpPr>
-        <p:cNvPr id="189" name="Shape 189"/>
+        <p:cNvPr id="190" name="Shape 190"/>
         <p:cNvGrpSpPr/>
         <p:nvPr/>
       </p:nvGrpSpPr>
@@ -32303,7 +32319,7 @@
       </p:grpSpPr>
       <p:pic>
         <p:nvPicPr>
-          <p:cNvPr id="190" name="Google Shape;190;p39"/>
+          <p:cNvPr id="191" name="Google Shape;191;p39"/>
           <p:cNvPicPr preferRelativeResize="0"/>
           <p:nvPr/>
         </p:nvPicPr>
@@ -32331,7 +32347,7 @@
       </p:pic>
       <p:sp>
         <p:nvSpPr>
-          <p:cNvPr id="191" name="Google Shape;191;p39"/>
+          <p:cNvPr id="192" name="Google Shape;192;p39"/>
           <p:cNvSpPr txBox="1"/>
           <p:nvPr>
             <p:ph type="title"/>
@@ -32379,7 +32395,7 @@
       </p:sp>
       <p:sp>
         <p:nvSpPr>
-          <p:cNvPr id="192" name="Google Shape;192;p39"/>
+          <p:cNvPr id="193" name="Google Shape;193;p39"/>
           <p:cNvSpPr txBox="1"/>
           <p:nvPr>
             <p:ph idx="12" type="sldNum"/>
@@ -32427,7 +32443,7 @@
       </p:sp>
       <p:sp>
         <p:nvSpPr>
-          <p:cNvPr id="193" name="Google Shape;193;p39"/>
+          <p:cNvPr id="194" name="Google Shape;194;p39"/>
           <p:cNvSpPr txBox="1"/>
           <p:nvPr/>
         </p:nvSpPr>
@@ -32617,7 +32633,7 @@
       </p:sp>
       <p:pic>
         <p:nvPicPr>
-          <p:cNvPr id="194" name="Google Shape;194;p39"/>
+          <p:cNvPr id="195" name="Google Shape;195;p39"/>
           <p:cNvPicPr preferRelativeResize="0"/>
           <p:nvPr/>
         </p:nvPicPr>
@@ -32655,7 +32671,7 @@
   <p:cSld>
     <p:spTree>
       <p:nvGrpSpPr>
-        <p:cNvPr id="454" name="Shape 454"/>
+        <p:cNvPr id="455" name="Shape 455"/>
         <p:cNvGrpSpPr/>
         <p:nvPr/>
       </p:nvGrpSpPr>
@@ -32669,7 +32685,7 @@
       </p:grpSpPr>
       <p:pic>
         <p:nvPicPr>
-          <p:cNvPr id="455" name="Google Shape;455;p66"/>
+          <p:cNvPr id="456" name="Google Shape;456;p66"/>
           <p:cNvPicPr preferRelativeResize="0"/>
           <p:nvPr/>
         </p:nvPicPr>
@@ -32697,7 +32713,7 @@
       </p:pic>
       <p:sp>
         <p:nvSpPr>
-          <p:cNvPr id="456" name="Google Shape;456;p66"/>
+          <p:cNvPr id="457" name="Google Shape;457;p66"/>
           <p:cNvSpPr txBox="1"/>
           <p:nvPr>
             <p:ph type="title"/>
@@ -32745,7 +32761,7 @@
       </p:sp>
       <p:sp>
         <p:nvSpPr>
-          <p:cNvPr id="457" name="Google Shape;457;p66"/>
+          <p:cNvPr id="458" name="Google Shape;458;p66"/>
           <p:cNvSpPr txBox="1"/>
           <p:nvPr>
             <p:ph idx="12" type="sldNum"/>
@@ -32793,7 +32809,7 @@
       </p:sp>
       <p:sp>
         <p:nvSpPr>
-          <p:cNvPr id="458" name="Google Shape;458;p66"/>
+          <p:cNvPr id="459" name="Google Shape;459;p66"/>
           <p:cNvSpPr txBox="1"/>
           <p:nvPr/>
         </p:nvSpPr>
@@ -32870,7 +32886,7 @@
   <p:cSld>
     <p:spTree>
       <p:nvGrpSpPr>
-        <p:cNvPr id="462" name="Shape 462"/>
+        <p:cNvPr id="463" name="Shape 463"/>
         <p:cNvGrpSpPr/>
         <p:nvPr/>
       </p:nvGrpSpPr>
@@ -32884,7 +32900,7 @@
       </p:grpSpPr>
       <p:pic>
         <p:nvPicPr>
-          <p:cNvPr id="463" name="Google Shape;463;p67"/>
+          <p:cNvPr id="464" name="Google Shape;464;p67"/>
           <p:cNvPicPr preferRelativeResize="0"/>
           <p:nvPr/>
         </p:nvPicPr>
@@ -32912,7 +32928,7 @@
       </p:pic>
       <p:sp>
         <p:nvSpPr>
-          <p:cNvPr id="464" name="Google Shape;464;p67"/>
+          <p:cNvPr id="465" name="Google Shape;465;p67"/>
           <p:cNvSpPr txBox="1"/>
           <p:nvPr>
             <p:ph type="title"/>
@@ -32960,7 +32976,7 @@
       </p:sp>
       <p:sp>
         <p:nvSpPr>
-          <p:cNvPr id="465" name="Google Shape;465;p67"/>
+          <p:cNvPr id="466" name="Google Shape;466;p67"/>
           <p:cNvSpPr txBox="1"/>
           <p:nvPr>
             <p:ph idx="12" type="sldNum"/>
@@ -33008,7 +33024,7 @@
       </p:sp>
       <p:sp>
         <p:nvSpPr>
-          <p:cNvPr id="466" name="Google Shape;466;p67"/>
+          <p:cNvPr id="467" name="Google Shape;467;p67"/>
           <p:cNvSpPr txBox="1"/>
           <p:nvPr/>
         </p:nvSpPr>
@@ -33146,7 +33162,7 @@
       </p:sp>
       <p:pic>
         <p:nvPicPr>
-          <p:cNvPr id="467" name="Google Shape;467;p67"/>
+          <p:cNvPr id="468" name="Google Shape;468;p67"/>
           <p:cNvPicPr preferRelativeResize="0"/>
           <p:nvPr/>
         </p:nvPicPr>
@@ -33174,7 +33190,7 @@
       </p:pic>
       <p:sp>
         <p:nvSpPr>
-          <p:cNvPr id="468" name="Google Shape;468;p67"/>
+          <p:cNvPr id="469" name="Google Shape;469;p67"/>
           <p:cNvSpPr txBox="1"/>
           <p:nvPr/>
         </p:nvSpPr>
@@ -33237,7 +33253,7 @@
   <p:cSld>
     <p:spTree>
       <p:nvGrpSpPr>
-        <p:cNvPr id="472" name="Shape 472"/>
+        <p:cNvPr id="473" name="Shape 473"/>
         <p:cNvGrpSpPr/>
         <p:nvPr/>
       </p:nvGrpSpPr>
@@ -33251,7 +33267,7 @@
       </p:grpSpPr>
       <p:pic>
         <p:nvPicPr>
-          <p:cNvPr id="473" name="Google Shape;473;p68"/>
+          <p:cNvPr id="474" name="Google Shape;474;p68"/>
           <p:cNvPicPr preferRelativeResize="0"/>
           <p:nvPr/>
         </p:nvPicPr>
@@ -33279,7 +33295,7 @@
       </p:pic>
       <p:sp>
         <p:nvSpPr>
-          <p:cNvPr id="474" name="Google Shape;474;p68"/>
+          <p:cNvPr id="475" name="Google Shape;475;p68"/>
           <p:cNvSpPr txBox="1"/>
           <p:nvPr>
             <p:ph type="title"/>
@@ -33327,7 +33343,7 @@
       </p:sp>
       <p:sp>
         <p:nvSpPr>
-          <p:cNvPr id="475" name="Google Shape;475;p68"/>
+          <p:cNvPr id="476" name="Google Shape;476;p68"/>
           <p:cNvSpPr txBox="1"/>
           <p:nvPr>
             <p:ph idx="12" type="sldNum"/>
@@ -33375,7 +33391,7 @@
       </p:sp>
       <p:pic>
         <p:nvPicPr>
-          <p:cNvPr id="476" name="Google Shape;476;p68"/>
+          <p:cNvPr id="477" name="Google Shape;477;p68"/>
           <p:cNvPicPr preferRelativeResize="0"/>
           <p:nvPr/>
         </p:nvPicPr>
@@ -33403,7 +33419,7 @@
       </p:pic>
       <p:sp>
         <p:nvSpPr>
-          <p:cNvPr id="477" name="Google Shape;477;p68"/>
+          <p:cNvPr id="478" name="Google Shape;478;p68"/>
           <p:cNvSpPr txBox="1"/>
           <p:nvPr/>
         </p:nvSpPr>
@@ -33455,7 +33471,7 @@
       </p:sp>
       <p:sp>
         <p:nvSpPr>
-          <p:cNvPr id="478" name="Google Shape;478;p68"/>
+          <p:cNvPr id="479" name="Google Shape;479;p68"/>
           <p:cNvSpPr txBox="1"/>
           <p:nvPr/>
         </p:nvSpPr>
@@ -33556,7 +33572,7 @@
   <p:cSld>
     <p:spTree>
       <p:nvGrpSpPr>
-        <p:cNvPr id="482" name="Shape 482"/>
+        <p:cNvPr id="483" name="Shape 483"/>
         <p:cNvGrpSpPr/>
         <p:nvPr/>
       </p:nvGrpSpPr>
@@ -33570,7 +33586,7 @@
       </p:grpSpPr>
       <p:pic>
         <p:nvPicPr>
-          <p:cNvPr id="483" name="Google Shape;483;p69"/>
+          <p:cNvPr id="484" name="Google Shape;484;p69"/>
           <p:cNvPicPr preferRelativeResize="0"/>
           <p:nvPr/>
         </p:nvPicPr>
@@ -33598,7 +33614,7 @@
       </p:pic>
       <p:sp>
         <p:nvSpPr>
-          <p:cNvPr id="484" name="Google Shape;484;p69"/>
+          <p:cNvPr id="485" name="Google Shape;485;p69"/>
           <p:cNvSpPr txBox="1"/>
           <p:nvPr>
             <p:ph type="title"/>
@@ -33646,7 +33662,7 @@
       </p:sp>
       <p:sp>
         <p:nvSpPr>
-          <p:cNvPr id="485" name="Google Shape;485;p69"/>
+          <p:cNvPr id="486" name="Google Shape;486;p69"/>
           <p:cNvSpPr txBox="1"/>
           <p:nvPr>
             <p:ph idx="12" type="sldNum"/>
@@ -33702,7 +33718,7 @@
       </p:sp>
       <p:sp>
         <p:nvSpPr>
-          <p:cNvPr id="486" name="Google Shape;486;p69"/>
+          <p:cNvPr id="487" name="Google Shape;487;p69"/>
           <p:cNvSpPr txBox="1"/>
           <p:nvPr/>
         </p:nvSpPr>
@@ -33774,7 +33790,7 @@
       </p:sp>
       <p:sp>
         <p:nvSpPr>
-          <p:cNvPr id="487" name="Google Shape;487;p69"/>
+          <p:cNvPr id="488" name="Google Shape;488;p69"/>
           <p:cNvSpPr txBox="1"/>
           <p:nvPr/>
         </p:nvSpPr>
@@ -33815,7 +33831,7 @@
       </p:sp>
       <p:sp>
         <p:nvSpPr>
-          <p:cNvPr id="488" name="Google Shape;488;p69"/>
+          <p:cNvPr id="489" name="Google Shape;489;p69"/>
           <p:cNvSpPr txBox="1"/>
           <p:nvPr/>
         </p:nvSpPr>
@@ -33909,7 +33925,7 @@
       </p:sp>
       <p:sp>
         <p:nvSpPr>
-          <p:cNvPr id="489" name="Google Shape;489;p69"/>
+          <p:cNvPr id="490" name="Google Shape;490;p69"/>
           <p:cNvSpPr txBox="1"/>
           <p:nvPr/>
         </p:nvSpPr>
@@ -33981,7 +33997,7 @@
       </p:sp>
       <p:sp>
         <p:nvSpPr>
-          <p:cNvPr id="490" name="Google Shape;490;p69"/>
+          <p:cNvPr id="491" name="Google Shape;491;p69"/>
           <p:cNvSpPr txBox="1"/>
           <p:nvPr/>
         </p:nvSpPr>
@@ -34083,7 +34099,7 @@
       </p:sp>
       <p:sp>
         <p:nvSpPr>
-          <p:cNvPr id="491" name="Google Shape;491;p69"/>
+          <p:cNvPr id="492" name="Google Shape;492;p69"/>
           <p:cNvSpPr txBox="1"/>
           <p:nvPr/>
         </p:nvSpPr>
@@ -34137,7 +34153,7 @@
       </p:sp>
       <p:sp>
         <p:nvSpPr>
-          <p:cNvPr id="492" name="Google Shape;492;p69"/>
+          <p:cNvPr id="493" name="Google Shape;493;p69"/>
           <p:cNvSpPr txBox="1"/>
           <p:nvPr/>
         </p:nvSpPr>
@@ -34238,7 +34254,7 @@
       </p:sp>
       <p:sp>
         <p:nvSpPr>
-          <p:cNvPr id="493" name="Google Shape;493;p69"/>
+          <p:cNvPr id="494" name="Google Shape;494;p69"/>
           <p:cNvSpPr txBox="1"/>
           <p:nvPr/>
         </p:nvSpPr>
@@ -34280,7 +34296,7 @@
       </p:sp>
       <p:sp>
         <p:nvSpPr>
-          <p:cNvPr id="494" name="Google Shape;494;p69"/>
+          <p:cNvPr id="495" name="Google Shape;495;p69"/>
           <p:cNvSpPr txBox="1"/>
           <p:nvPr/>
         </p:nvSpPr>
@@ -34322,7 +34338,7 @@
       </p:sp>
       <p:sp>
         <p:nvSpPr>
-          <p:cNvPr id="495" name="Google Shape;495;p69"/>
+          <p:cNvPr id="496" name="Google Shape;496;p69"/>
           <p:cNvSpPr txBox="1"/>
           <p:nvPr/>
         </p:nvSpPr>
@@ -34375,59 +34391,6 @@
             <p:seq concurrent="1" nextAc="seek">
               <p:cTn dur="indefinite" id="2" nodeType="mainSeq">
                 <p:childTnLst>
-                  <p:par>
-                    <p:cTn fill="hold">
-                      <p:stCondLst>
-                        <p:cond delay="indefinite"/>
-                      </p:stCondLst>
-                      <p:childTnLst>
-                        <p:par>
-                          <p:cTn fill="hold">
-                            <p:stCondLst>
-                              <p:cond delay="0"/>
-                            </p:stCondLst>
-                            <p:childTnLst>
-                              <p:par>
-                                <p:cTn fill="hold" nodeType="clickEffect" presetClass="entr" presetID="10" presetSubtype="0">
-                                  <p:stCondLst>
-                                    <p:cond delay="0"/>
-                                  </p:stCondLst>
-                                  <p:childTnLst>
-                                    <p:set>
-                                      <p:cBhvr>
-                                        <p:cTn dur="1" fill="hold">
-                                          <p:stCondLst>
-                                            <p:cond delay="0"/>
-                                          </p:stCondLst>
-                                        </p:cTn>
-                                        <p:tgtEl>
-                                          <p:spTgt spid="493"/>
-                                        </p:tgtEl>
-                                        <p:attrNameLst>
-                                          <p:attrName>style.visibility</p:attrName>
-                                        </p:attrNameLst>
-                                      </p:cBhvr>
-                                      <p:to>
-                                        <p:strVal val="visible"/>
-                                      </p:to>
-                                    </p:set>
-                                    <p:animEffect filter="fade" transition="in">
-                                      <p:cBhvr>
-                                        <p:cTn dur="1000"/>
-                                        <p:tgtEl>
-                                          <p:spTgt spid="493"/>
-                                        </p:tgtEl>
-                                      </p:cBhvr>
-                                    </p:animEffect>
-                                  </p:childTnLst>
-                                </p:cTn>
-                              </p:par>
-                            </p:childTnLst>
-                          </p:cTn>
-                        </p:par>
-                      </p:childTnLst>
-                    </p:cTn>
-                  </p:par>
                   <p:par>
                     <p:cTn fill="hold">
                       <p:stCondLst>
@@ -34534,6 +34497,59 @@
                       </p:childTnLst>
                     </p:cTn>
                   </p:par>
+                  <p:par>
+                    <p:cTn fill="hold">
+                      <p:stCondLst>
+                        <p:cond delay="indefinite"/>
+                      </p:stCondLst>
+                      <p:childTnLst>
+                        <p:par>
+                          <p:cTn fill="hold">
+                            <p:stCondLst>
+                              <p:cond delay="0"/>
+                            </p:stCondLst>
+                            <p:childTnLst>
+                              <p:par>
+                                <p:cTn fill="hold" nodeType="clickEffect" presetClass="entr" presetID="10" presetSubtype="0">
+                                  <p:stCondLst>
+                                    <p:cond delay="0"/>
+                                  </p:stCondLst>
+                                  <p:childTnLst>
+                                    <p:set>
+                                      <p:cBhvr>
+                                        <p:cTn dur="1" fill="hold">
+                                          <p:stCondLst>
+                                            <p:cond delay="0"/>
+                                          </p:stCondLst>
+                                        </p:cTn>
+                                        <p:tgtEl>
+                                          <p:spTgt spid="496"/>
+                                        </p:tgtEl>
+                                        <p:attrNameLst>
+                                          <p:attrName>style.visibility</p:attrName>
+                                        </p:attrNameLst>
+                                      </p:cBhvr>
+                                      <p:to>
+                                        <p:strVal val="visible"/>
+                                      </p:to>
+                                    </p:set>
+                                    <p:animEffect filter="fade" transition="in">
+                                      <p:cBhvr>
+                                        <p:cTn dur="1000"/>
+                                        <p:tgtEl>
+                                          <p:spTgt spid="496"/>
+                                        </p:tgtEl>
+                                      </p:cBhvr>
+                                    </p:animEffect>
+                                  </p:childTnLst>
+                                </p:cTn>
+                              </p:par>
+                            </p:childTnLst>
+                          </p:cTn>
+                        </p:par>
+                      </p:childTnLst>
+                    </p:cTn>
+                  </p:par>
                 </p:childTnLst>
               </p:cTn>
               <p:prevCondLst>
@@ -34564,7 +34580,7 @@
   <p:cSld>
     <p:spTree>
       <p:nvGrpSpPr>
-        <p:cNvPr id="499" name="Shape 499"/>
+        <p:cNvPr id="500" name="Shape 500"/>
         <p:cNvGrpSpPr/>
         <p:nvPr/>
       </p:nvGrpSpPr>
@@ -34578,7 +34594,7 @@
       </p:grpSpPr>
       <p:pic>
         <p:nvPicPr>
-          <p:cNvPr id="500" name="Google Shape;500;p70"/>
+          <p:cNvPr id="501" name="Google Shape;501;p70"/>
           <p:cNvPicPr preferRelativeResize="0"/>
           <p:nvPr/>
         </p:nvPicPr>
@@ -34606,7 +34622,7 @@
       </p:pic>
       <p:sp>
         <p:nvSpPr>
-          <p:cNvPr id="501" name="Google Shape;501;p70"/>
+          <p:cNvPr id="502" name="Google Shape;502;p70"/>
           <p:cNvSpPr txBox="1"/>
           <p:nvPr>
             <p:ph type="title"/>
@@ -34654,7 +34670,7 @@
       </p:sp>
       <p:sp>
         <p:nvSpPr>
-          <p:cNvPr id="502" name="Google Shape;502;p70"/>
+          <p:cNvPr id="503" name="Google Shape;503;p70"/>
           <p:cNvSpPr txBox="1"/>
           <p:nvPr/>
         </p:nvSpPr>
@@ -34808,7 +34824,7 @@
       </p:sp>
       <p:sp>
         <p:nvSpPr>
-          <p:cNvPr id="503" name="Google Shape;503;p70"/>
+          <p:cNvPr id="504" name="Google Shape;504;p70"/>
           <p:cNvSpPr txBox="1"/>
           <p:nvPr>
             <p:ph idx="12" type="sldNum"/>
@@ -34867,7 +34883,7 @@
   <p:cSld>
     <p:spTree>
       <p:nvGrpSpPr>
-        <p:cNvPr id="198" name="Shape 198"/>
+        <p:cNvPr id="199" name="Shape 199"/>
         <p:cNvGrpSpPr/>
         <p:nvPr/>
       </p:nvGrpSpPr>
@@ -34881,7 +34897,7 @@
       </p:grpSpPr>
       <p:pic>
         <p:nvPicPr>
-          <p:cNvPr id="199" name="Google Shape;199;p40"/>
+          <p:cNvPr id="200" name="Google Shape;200;p40"/>
           <p:cNvPicPr preferRelativeResize="0"/>
           <p:nvPr/>
         </p:nvPicPr>
@@ -34909,7 +34925,7 @@
       </p:pic>
       <p:sp>
         <p:nvSpPr>
-          <p:cNvPr id="200" name="Google Shape;200;p40"/>
+          <p:cNvPr id="201" name="Google Shape;201;p40"/>
           <p:cNvSpPr txBox="1"/>
           <p:nvPr>
             <p:ph type="title"/>
@@ -34957,7 +34973,7 @@
       </p:sp>
       <p:sp>
         <p:nvSpPr>
-          <p:cNvPr id="201" name="Google Shape;201;p40"/>
+          <p:cNvPr id="202" name="Google Shape;202;p40"/>
           <p:cNvSpPr txBox="1"/>
           <p:nvPr/>
         </p:nvSpPr>
@@ -35290,7 +35306,7 @@
       </p:sp>
       <p:sp>
         <p:nvSpPr>
-          <p:cNvPr id="202" name="Google Shape;202;p40"/>
+          <p:cNvPr id="203" name="Google Shape;203;p40"/>
           <p:cNvSpPr txBox="1"/>
           <p:nvPr>
             <p:ph idx="12" type="sldNum"/>
@@ -35338,7 +35354,7 @@
       </p:sp>
       <p:sp>
         <p:nvSpPr>
-          <p:cNvPr id="203" name="Google Shape;203;p40"/>
+          <p:cNvPr id="204" name="Google Shape;204;p40"/>
           <p:cNvSpPr txBox="1"/>
           <p:nvPr/>
         </p:nvSpPr>
@@ -35390,7 +35406,7 @@
       </p:sp>
       <p:pic>
         <p:nvPicPr>
-          <p:cNvPr id="204" name="Google Shape;204;p40"/>
+          <p:cNvPr id="205" name="Google Shape;205;p40"/>
           <p:cNvPicPr preferRelativeResize="0"/>
           <p:nvPr/>
         </p:nvPicPr>
@@ -35429,7 +35445,7 @@
   <p:cSld>
     <p:spTree>
       <p:nvGrpSpPr>
-        <p:cNvPr id="208" name="Shape 208"/>
+        <p:cNvPr id="209" name="Shape 209"/>
         <p:cNvGrpSpPr/>
         <p:nvPr/>
       </p:nvGrpSpPr>
@@ -35443,7 +35459,7 @@
       </p:grpSpPr>
       <p:pic>
         <p:nvPicPr>
-          <p:cNvPr id="209" name="Google Shape;209;p41"/>
+          <p:cNvPr id="210" name="Google Shape;210;p41"/>
           <p:cNvPicPr preferRelativeResize="0"/>
           <p:nvPr/>
         </p:nvPicPr>
@@ -35471,7 +35487,7 @@
       </p:pic>
       <p:pic>
         <p:nvPicPr>
-          <p:cNvPr id="210" name="Google Shape;210;p41"/>
+          <p:cNvPr id="211" name="Google Shape;211;p41"/>
           <p:cNvPicPr preferRelativeResize="0"/>
           <p:nvPr/>
         </p:nvPicPr>
@@ -35499,7 +35515,7 @@
       </p:pic>
       <p:sp>
         <p:nvSpPr>
-          <p:cNvPr id="211" name="Google Shape;211;p41"/>
+          <p:cNvPr id="212" name="Google Shape;212;p41"/>
           <p:cNvSpPr txBox="1"/>
           <p:nvPr>
             <p:ph type="title"/>
@@ -35547,14 +35563,14 @@
       </p:sp>
       <p:sp>
         <p:nvSpPr>
-          <p:cNvPr id="212" name="Google Shape;212;p41"/>
+          <p:cNvPr id="213" name="Google Shape;213;p41"/>
           <p:cNvSpPr txBox="1"/>
           <p:nvPr/>
         </p:nvSpPr>
         <p:spPr>
           <a:xfrm>
             <a:off x="233775" y="648450"/>
-            <a:ext cx="7414800" cy="3869700"/>
+            <a:ext cx="8304000" cy="3869700"/>
           </a:xfrm>
           <a:prstGeom prst="rect">
             <a:avLst/>
@@ -35588,7 +35604,7 @@
             </a:r>
             <a:r>
               <a:rPr lang="en"/>
-              <a:t>ransforms the original input data such that in their transformed versions (called the ‘latent representation’) data belonging to separate categories are divided by a clear gap that is made as wide as possible. In this case we show a prediction of whether a protein is ordered or disordered, with the axes representing dimensions of the transformed data.</a:t>
+              <a:t>ransforms the original input data into their transformed versions (called the ‘latent representation’), such that data belonging to separate categories can be divided by a clear gap that is made as wide as possible. In this case we show a prediction of whether a protein is ordered or disordered, with the axes representing dimensions of the transformed data.</a:t>
             </a:r>
             <a:endParaRPr/>
           </a:p>
@@ -35819,7 +35835,7 @@
       </p:sp>
       <p:sp>
         <p:nvSpPr>
-          <p:cNvPr id="213" name="Google Shape;213;p41"/>
+          <p:cNvPr id="214" name="Google Shape;214;p41"/>
           <p:cNvSpPr txBox="1"/>
           <p:nvPr>
             <p:ph idx="12" type="sldNum"/>
@@ -35867,7 +35883,7 @@
       </p:sp>
       <p:sp>
         <p:nvSpPr>
-          <p:cNvPr id="214" name="Google Shape;214;p41"/>
+          <p:cNvPr id="215" name="Google Shape;215;p41"/>
           <p:cNvSpPr txBox="1"/>
           <p:nvPr/>
         </p:nvSpPr>
@@ -35930,7 +35946,7 @@
   <p:cSld>
     <p:spTree>
       <p:nvGrpSpPr>
-        <p:cNvPr id="218" name="Shape 218"/>
+        <p:cNvPr id="219" name="Shape 219"/>
         <p:cNvGrpSpPr/>
         <p:nvPr/>
       </p:nvGrpSpPr>
@@ -35944,7 +35960,7 @@
       </p:grpSpPr>
       <p:pic>
         <p:nvPicPr>
-          <p:cNvPr id="219" name="Google Shape;219;p42"/>
+          <p:cNvPr id="220" name="Google Shape;220;p42"/>
           <p:cNvPicPr preferRelativeResize="0"/>
           <p:nvPr/>
         </p:nvPicPr>
@@ -35972,7 +35988,7 @@
       </p:pic>
       <p:sp>
         <p:nvSpPr>
-          <p:cNvPr id="220" name="Google Shape;220;p42"/>
+          <p:cNvPr id="221" name="Google Shape;221;p42"/>
           <p:cNvSpPr txBox="1"/>
           <p:nvPr>
             <p:ph type="title"/>
@@ -36020,7 +36036,7 @@
       </p:sp>
       <p:sp>
         <p:nvSpPr>
-          <p:cNvPr id="221" name="Google Shape;221;p42"/>
+          <p:cNvPr id="222" name="Google Shape;222;p42"/>
           <p:cNvSpPr txBox="1"/>
           <p:nvPr/>
         </p:nvSpPr>
@@ -36345,7 +36361,7 @@
       </p:sp>
       <p:sp>
         <p:nvSpPr>
-          <p:cNvPr id="222" name="Google Shape;222;p42"/>
+          <p:cNvPr id="223" name="Google Shape;223;p42"/>
           <p:cNvSpPr txBox="1"/>
           <p:nvPr>
             <p:ph idx="12" type="sldNum"/>
@@ -36393,7 +36409,7 @@
       </p:sp>
       <p:sp>
         <p:nvSpPr>
-          <p:cNvPr id="223" name="Google Shape;223;p42"/>
+          <p:cNvPr id="224" name="Google Shape;224;p42"/>
           <p:cNvSpPr txBox="1"/>
           <p:nvPr/>
         </p:nvSpPr>
@@ -36445,7 +36461,7 @@
       </p:sp>
       <p:pic>
         <p:nvPicPr>
-          <p:cNvPr id="224" name="Google Shape;224;p42"/>
+          <p:cNvPr id="225" name="Google Shape;225;p42"/>
           <p:cNvPicPr preferRelativeResize="0"/>
           <p:nvPr/>
         </p:nvPicPr>
@@ -36484,7 +36500,7 @@
   <p:cSld>
     <p:spTree>
       <p:nvGrpSpPr>
-        <p:cNvPr id="228" name="Shape 228"/>
+        <p:cNvPr id="229" name="Shape 229"/>
         <p:cNvGrpSpPr/>
         <p:nvPr/>
       </p:nvGrpSpPr>
@@ -36498,7 +36514,7 @@
       </p:grpSpPr>
       <p:pic>
         <p:nvPicPr>
-          <p:cNvPr id="229" name="Google Shape;229;p43"/>
+          <p:cNvPr id="230" name="Google Shape;230;p43"/>
           <p:cNvPicPr preferRelativeResize="0"/>
           <p:nvPr/>
         </p:nvPicPr>
@@ -36526,7 +36542,7 @@
       </p:pic>
       <p:sp>
         <p:nvSpPr>
-          <p:cNvPr id="230" name="Google Shape;230;p43"/>
+          <p:cNvPr id="231" name="Google Shape;231;p43"/>
           <p:cNvSpPr txBox="1"/>
           <p:nvPr>
             <p:ph type="title"/>
@@ -36574,7 +36590,7 @@
       </p:sp>
       <p:sp>
         <p:nvSpPr>
-          <p:cNvPr id="231" name="Google Shape;231;p43"/>
+          <p:cNvPr id="232" name="Google Shape;232;p43"/>
           <p:cNvSpPr txBox="1"/>
           <p:nvPr/>
         </p:nvSpPr>
@@ -36859,7 +36875,7 @@
       </p:sp>
       <p:sp>
         <p:nvSpPr>
-          <p:cNvPr id="232" name="Google Shape;232;p43"/>
+          <p:cNvPr id="233" name="Google Shape;233;p43"/>
           <p:cNvSpPr txBox="1"/>
           <p:nvPr>
             <p:ph idx="12" type="sldNum"/>
@@ -36907,7 +36923,7 @@
       </p:sp>
       <p:sp>
         <p:nvSpPr>
-          <p:cNvPr id="233" name="Google Shape;233;p43"/>
+          <p:cNvPr id="234" name="Google Shape;234;p43"/>
           <p:cNvSpPr txBox="1"/>
           <p:nvPr/>
         </p:nvSpPr>
@@ -36959,7 +36975,7 @@
       </p:sp>
       <p:pic>
         <p:nvPicPr>
-          <p:cNvPr id="234" name="Google Shape;234;p43"/>
+          <p:cNvPr id="235" name="Google Shape;235;p43"/>
           <p:cNvPicPr preferRelativeResize="0"/>
           <p:nvPr/>
         </p:nvPicPr>
@@ -36998,7 +37014,7 @@
   <p:cSld>
     <p:spTree>
       <p:nvGrpSpPr>
-        <p:cNvPr id="238" name="Shape 238"/>
+        <p:cNvPr id="239" name="Shape 239"/>
         <p:cNvGrpSpPr/>
         <p:nvPr/>
       </p:nvGrpSpPr>
@@ -37012,7 +37028,7 @@
       </p:grpSpPr>
       <p:pic>
         <p:nvPicPr>
-          <p:cNvPr id="239" name="Google Shape;239;p44"/>
+          <p:cNvPr id="240" name="Google Shape;240;p44"/>
           <p:cNvPicPr preferRelativeResize="0"/>
           <p:nvPr/>
         </p:nvPicPr>
@@ -37040,7 +37056,7 @@
       </p:pic>
       <p:sp>
         <p:nvSpPr>
-          <p:cNvPr id="240" name="Google Shape;240;p44"/>
+          <p:cNvPr id="241" name="Google Shape;241;p44"/>
           <p:cNvSpPr txBox="1"/>
           <p:nvPr>
             <p:ph type="title"/>
@@ -37088,7 +37104,7 @@
       </p:sp>
       <p:sp>
         <p:nvSpPr>
-          <p:cNvPr id="241" name="Google Shape;241;p44"/>
+          <p:cNvPr id="242" name="Google Shape;242;p44"/>
           <p:cNvSpPr txBox="1"/>
           <p:nvPr/>
         </p:nvSpPr>
@@ -37377,7 +37393,7 @@
       </p:sp>
       <p:sp>
         <p:nvSpPr>
-          <p:cNvPr id="242" name="Google Shape;242;p44"/>
+          <p:cNvPr id="243" name="Google Shape;243;p44"/>
           <p:cNvSpPr txBox="1"/>
           <p:nvPr>
             <p:ph idx="12" type="sldNum"/>
@@ -37425,7 +37441,7 @@
       </p:sp>
       <p:sp>
         <p:nvSpPr>
-          <p:cNvPr id="243" name="Google Shape;243;p44"/>
+          <p:cNvPr id="244" name="Google Shape;244;p44"/>
           <p:cNvSpPr txBox="1"/>
           <p:nvPr/>
         </p:nvSpPr>
@@ -37477,7 +37493,7 @@
       </p:sp>
       <p:pic>
         <p:nvPicPr>
-          <p:cNvPr id="244" name="Google Shape;244;p44"/>
+          <p:cNvPr id="245" name="Google Shape;245;p44"/>
           <p:cNvPicPr preferRelativeResize="0"/>
           <p:nvPr/>
         </p:nvPicPr>
@@ -37516,7 +37532,7 @@
   <p:cSld>
     <p:spTree>
       <p:nvGrpSpPr>
-        <p:cNvPr id="248" name="Shape 248"/>
+        <p:cNvPr id="249" name="Shape 249"/>
         <p:cNvGrpSpPr/>
         <p:nvPr/>
       </p:nvGrpSpPr>
@@ -37530,7 +37546,7 @@
       </p:grpSpPr>
       <p:pic>
         <p:nvPicPr>
-          <p:cNvPr id="249" name="Google Shape;249;p45"/>
+          <p:cNvPr id="250" name="Google Shape;250;p45"/>
           <p:cNvPicPr preferRelativeResize="0"/>
           <p:nvPr/>
         </p:nvPicPr>
@@ -37558,7 +37574,7 @@
       </p:pic>
       <p:sp>
         <p:nvSpPr>
-          <p:cNvPr id="250" name="Google Shape;250;p45"/>
+          <p:cNvPr id="251" name="Google Shape;251;p45"/>
           <p:cNvSpPr txBox="1"/>
           <p:nvPr>
             <p:ph type="title"/>
@@ -37594,7 +37610,7 @@
                   <a:srgbClr val="4A86E8"/>
                 </a:solidFill>
               </a:rPr>
-              <a:t>Dimensionality reduction (e.g. PCA)</a:t>
+              <a:t>Dimensionality Reduction (e.g. PCA)</a:t>
             </a:r>
             <a:endParaRPr>
               <a:solidFill>
@@ -37606,14 +37622,14 @@
       </p:sp>
       <p:sp>
         <p:nvSpPr>
-          <p:cNvPr id="251" name="Google Shape;251;p45"/>
+          <p:cNvPr id="252" name="Google Shape;252;p45"/>
           <p:cNvSpPr txBox="1"/>
           <p:nvPr/>
         </p:nvSpPr>
         <p:spPr>
           <a:xfrm>
             <a:off x="335850" y="643800"/>
-            <a:ext cx="8472300" cy="4066500"/>
+            <a:ext cx="8472300" cy="3836400"/>
           </a:xfrm>
           <a:prstGeom prst="rect">
             <a:avLst/>
@@ -37643,7 +37659,7 @@
             </a:pPr>
             <a:r>
               <a:rPr lang="en" sz="1300"/>
-              <a:t>Finds a series of feature combinations that best describe the data while being orthogonal to each other. It is commonly used for dimensionality reduction. In the case of the height and weight of a person, the first principal component (PC1), corresponding to a linear combination of height and weight, describes the strong positive correlation, whereas PC2 might describe other variables that do not correlate strongly with those, such as percentage body fat or muscle mass.</a:t>
+              <a:t>Finds a series of feature combinations that best describe the data. It is commonly used for dimensionality reduction. In the case of the height and weight of a person, the first principal component (PC1), corresponding to a linear combination of height and weight, describes the strong positive correlation, whereas PC2 might describe other variables that do not correlate strongly with those, such as percentage body fat or muscle mass.</a:t>
             </a:r>
             <a:endParaRPr sz="1300"/>
           </a:p>
@@ -37891,7 +37907,7 @@
       </p:sp>
       <p:sp>
         <p:nvSpPr>
-          <p:cNvPr id="252" name="Google Shape;252;p45"/>
+          <p:cNvPr id="253" name="Google Shape;253;p45"/>
           <p:cNvSpPr txBox="1"/>
           <p:nvPr>
             <p:ph idx="12" type="sldNum"/>
@@ -37939,7 +37955,7 @@
       </p:sp>
       <p:pic>
         <p:nvPicPr>
-          <p:cNvPr id="253" name="Google Shape;253;p45"/>
+          <p:cNvPr id="254" name="Google Shape;254;p45"/>
           <p:cNvPicPr preferRelativeResize="0"/>
           <p:nvPr/>
         </p:nvPicPr>
@@ -37967,7 +37983,7 @@
       </p:pic>
       <p:sp>
         <p:nvSpPr>
-          <p:cNvPr id="254" name="Google Shape;254;p45"/>
+          <p:cNvPr id="255" name="Google Shape;255;p45"/>
           <p:cNvSpPr txBox="1"/>
           <p:nvPr/>
         </p:nvSpPr>
@@ -38305,9 +38321,9 @@
 </file>
 
 <file path=ppt/theme/theme2.xml><?xml version="1.0" encoding="utf-8"?>
-<a:theme xmlns:a="http://schemas.openxmlformats.org/drawingml/2006/main" xmlns:r="http://schemas.openxmlformats.org/officeDocument/2006/relationships" name="Simple Light">
+<a:theme xmlns:a="http://schemas.openxmlformats.org/drawingml/2006/main" xmlns:r="http://schemas.openxmlformats.org/officeDocument/2006/relationships">
   <a:themeElements>
-    <a:clrScheme name="Simple Light">
+    <a:clrScheme name="Default">
       <a:dk1>
         <a:srgbClr val="000000"/>
       </a:dk1>
@@ -38315,34 +38331,34 @@
         <a:srgbClr val="FFFFFF"/>
       </a:lt1>
       <a:dk2>
-        <a:srgbClr val="595959"/>
+        <a:srgbClr val="158158"/>
       </a:dk2>
       <a:lt2>
-        <a:srgbClr val="EEEEEE"/>
+        <a:srgbClr val="F3F3F3"/>
       </a:lt2>
       <a:accent1>
-        <a:srgbClr val="4285F4"/>
+        <a:srgbClr val="058DC7"/>
       </a:accent1>
       <a:accent2>
-        <a:srgbClr val="212121"/>
+        <a:srgbClr val="50B432"/>
       </a:accent2>
       <a:accent3>
-        <a:srgbClr val="78909C"/>
+        <a:srgbClr val="ED561B"/>
       </a:accent3>
       <a:accent4>
-        <a:srgbClr val="FFAB40"/>
+        <a:srgbClr val="EDEF00"/>
       </a:accent4>
       <a:accent5>
-        <a:srgbClr val="0097A7"/>
+        <a:srgbClr val="24CBE5"/>
       </a:accent5>
       <a:accent6>
-        <a:srgbClr val="EEFF41"/>
+        <a:srgbClr val="64E572"/>
       </a:accent6>
       <a:hlink>
-        <a:srgbClr val="0097A7"/>
+        <a:srgbClr val="2200CC"/>
       </a:hlink>
       <a:folHlink>
-        <a:srgbClr val="0097A7"/>
+        <a:srgbClr val="551A8B"/>
       </a:folHlink>
     </a:clrScheme>
     <a:fontScheme name="Office">
@@ -38863,9 +38879,9 @@
 </file>
 
 <file path=ppt/theme/theme4.xml><?xml version="1.0" encoding="utf-8"?>
-<a:theme xmlns:a="http://schemas.openxmlformats.org/drawingml/2006/main" xmlns:r="http://schemas.openxmlformats.org/officeDocument/2006/relationships">
+<a:theme xmlns:a="http://schemas.openxmlformats.org/drawingml/2006/main" xmlns:r="http://schemas.openxmlformats.org/officeDocument/2006/relationships" name="Simple Light">
   <a:themeElements>
-    <a:clrScheme name="Default">
+    <a:clrScheme name="Simple Light">
       <a:dk1>
         <a:srgbClr val="000000"/>
       </a:dk1>
@@ -38873,34 +38889,34 @@
         <a:srgbClr val="FFFFFF"/>
       </a:lt1>
       <a:dk2>
-        <a:srgbClr val="158158"/>
+        <a:srgbClr val="595959"/>
       </a:dk2>
       <a:lt2>
-        <a:srgbClr val="F3F3F3"/>
+        <a:srgbClr val="EEEEEE"/>
       </a:lt2>
       <a:accent1>
-        <a:srgbClr val="058DC7"/>
+        <a:srgbClr val="4285F4"/>
       </a:accent1>
       <a:accent2>
-        <a:srgbClr val="50B432"/>
+        <a:srgbClr val="212121"/>
       </a:accent2>
       <a:accent3>
-        <a:srgbClr val="ED561B"/>
+        <a:srgbClr val="78909C"/>
       </a:accent3>
       <a:accent4>
-        <a:srgbClr val="EDEF00"/>
+        <a:srgbClr val="FFAB40"/>
       </a:accent4>
       <a:accent5>
-        <a:srgbClr val="24CBE5"/>
+        <a:srgbClr val="0097A7"/>
       </a:accent5>
       <a:accent6>
-        <a:srgbClr val="64E572"/>
+        <a:srgbClr val="EEFF41"/>
       </a:accent6>
       <a:hlink>
-        <a:srgbClr val="2200CC"/>
+        <a:srgbClr val="0097A7"/>
       </a:hlink>
       <a:folHlink>
-        <a:srgbClr val="551A8B"/>
+        <a:srgbClr val="0097A7"/>
       </a:folHlink>
     </a:clrScheme>
     <a:fontScheme name="Office">

</xml_diff>